<commit_message>
[store] Modification de la fonctionnalité Recherche
</commit_message>
<xml_diff>
--- a/week1/saclay_local/WorkingDocs/presentation.pptx
+++ b/week1/saclay_local/WorkingDocs/presentation.pptx
@@ -122,7 +122,7 @@
 <file path=ppt/revisionInfo.xml><?xml version="1.0" encoding="utf-8"?>
 <p1510:revInfo xmlns:a="http://schemas.openxmlformats.org/drawingml/2006/main" xmlns:r="http://schemas.openxmlformats.org/officeDocument/2006/relationships" xmlns:p1510="http://schemas.microsoft.com/office/powerpoint/2015/10/main">
   <p1510:revLst>
-    <p1510:client id="{092E5D2B-4EBD-AF4D-AD6C-38A70AC5E8FC}" v="56" dt="2025-11-14T09:29:08.124"/>
+    <p1510:client id="{092E5D2B-4EBD-AF4D-AD6C-38A70AC5E8FC}" v="58" dt="2025-11-14T10:00:17.284"/>
   </p1510:revLst>
 </p1510:revInfo>
 </file>
@@ -12614,10 +12614,6 @@
           </a:p>
           <a:p>
             <a:r>
-              <a:rPr lang="en-GB" dirty="0"/>
-              <a:t> </a:t>
-            </a:r>
-            <a:r>
               <a:rPr lang="en-GB" b="1" dirty="0" err="1"/>
               <a:t>Produit</a:t>
             </a:r>
@@ -12647,10 +12643,6 @@
             </a:r>
           </a:p>
           <a:p>
-            <a:r>
-              <a:rPr lang="en-GB" dirty="0"/>
-              <a:t> </a:t>
-            </a:r>
             <a:r>
               <a:rPr lang="en-GB" b="1" dirty="0" err="1"/>
               <a:t>Producteur</a:t>
@@ -13267,7 +13259,7 @@
             </a:r>
             <a:r>
               <a:rPr lang="en-GB" dirty="0"/>
-              <a:t> par nom#</a:t>
+              <a:t> par nom</a:t>
             </a:r>
           </a:p>
           <a:p>
@@ -13808,7 +13800,7 @@
         <p:spPr>
           <a:xfrm>
             <a:off x="6495046" y="1489871"/>
-            <a:ext cx="5535319" cy="2862322"/>
+            <a:ext cx="5535319" cy="3046988"/>
           </a:xfrm>
           <a:prstGeom prst="rect">
             <a:avLst/>
@@ -13985,61 +13977,200 @@
             </a:r>
           </a:p>
           <a:p>
+            <a:r>
+              <a:rPr lang="en-GB" sz="1200" dirty="0"/>
+              <a:t>- En tant </a:t>
+            </a:r>
+            <a:r>
+              <a:rPr lang="en-GB" sz="1200" dirty="0" err="1"/>
+              <a:t>que</a:t>
+            </a:r>
+            <a:r>
+              <a:rPr lang="en-GB" sz="1200" dirty="0"/>
+              <a:t> </a:t>
+            </a:r>
+            <a:r>
+              <a:rPr lang="en-GB" sz="1200" dirty="0" err="1"/>
+              <a:t>visiteur</a:t>
+            </a:r>
+            <a:r>
+              <a:rPr lang="en-GB" sz="1200" dirty="0"/>
+              <a:t>, je </a:t>
+            </a:r>
+            <a:r>
+              <a:rPr lang="en-GB" sz="1200" dirty="0" err="1"/>
+              <a:t>peux</a:t>
+            </a:r>
+            <a:r>
+              <a:rPr lang="en-GB" sz="1200" dirty="0"/>
+              <a:t> </a:t>
+            </a:r>
+            <a:r>
+              <a:rPr lang="en-GB" sz="1200" dirty="0" err="1"/>
+              <a:t>retirer</a:t>
+            </a:r>
+            <a:r>
+              <a:rPr lang="en-GB" sz="1200" dirty="0"/>
+              <a:t> un </a:t>
+            </a:r>
+            <a:r>
+              <a:rPr lang="en-GB" sz="1200" dirty="0" err="1"/>
+              <a:t>produit</a:t>
+            </a:r>
+            <a:r>
+              <a:rPr lang="en-GB" sz="1200" dirty="0"/>
+              <a:t> de </a:t>
+            </a:r>
+            <a:r>
+              <a:rPr lang="en-GB" sz="1200" dirty="0" err="1"/>
+              <a:t>mon</a:t>
+            </a:r>
+            <a:r>
+              <a:rPr lang="en-GB" sz="1200" dirty="0"/>
+              <a:t> panier </a:t>
+            </a:r>
+          </a:p>
+          <a:p>
+            <a:r>
+              <a:rPr lang="en-GB" sz="1200" dirty="0"/>
+              <a:t>- En tant </a:t>
+            </a:r>
+            <a:r>
+              <a:rPr lang="en-GB" sz="1200" dirty="0" err="1"/>
+              <a:t>que</a:t>
+            </a:r>
+            <a:r>
+              <a:rPr lang="en-GB" sz="1200" dirty="0"/>
+              <a:t> </a:t>
+            </a:r>
+            <a:r>
+              <a:rPr lang="en-GB" sz="1200" dirty="0" err="1"/>
+              <a:t>visiteur</a:t>
+            </a:r>
+            <a:r>
+              <a:rPr lang="en-GB" sz="1200" dirty="0"/>
+              <a:t>, je </a:t>
+            </a:r>
+            <a:r>
+              <a:rPr lang="en-GB" sz="1200" dirty="0" err="1"/>
+              <a:t>peux</a:t>
+            </a:r>
+            <a:r>
+              <a:rPr lang="en-GB" sz="1200" dirty="0"/>
+              <a:t> voir le total de </a:t>
+            </a:r>
+            <a:r>
+              <a:rPr lang="en-GB" sz="1200" dirty="0" err="1"/>
+              <a:t>mon</a:t>
+            </a:r>
+            <a:r>
+              <a:rPr lang="en-GB" sz="1200" dirty="0"/>
+              <a:t> panier </a:t>
+            </a:r>
+          </a:p>
+          <a:p>
+            <a:r>
+              <a:rPr lang="en-GB" sz="1200" dirty="0"/>
+              <a:t>- En tant </a:t>
+            </a:r>
+            <a:r>
+              <a:rPr lang="en-GB" sz="1200" dirty="0" err="1"/>
+              <a:t>que</a:t>
+            </a:r>
+            <a:r>
+              <a:rPr lang="en-GB" sz="1200" dirty="0"/>
+              <a:t> </a:t>
+            </a:r>
+            <a:r>
+              <a:rPr lang="en-GB" sz="1200" dirty="0" err="1"/>
+              <a:t>visiteur</a:t>
+            </a:r>
+            <a:r>
+              <a:rPr lang="en-GB" sz="1200" dirty="0"/>
+              <a:t>, je </a:t>
+            </a:r>
+            <a:r>
+              <a:rPr lang="en-GB" sz="1200" dirty="0" err="1"/>
+              <a:t>peux</a:t>
+            </a:r>
+            <a:r>
+              <a:rPr lang="en-GB" sz="1200" dirty="0"/>
+              <a:t> </a:t>
+            </a:r>
+            <a:r>
+              <a:rPr lang="en-GB" sz="1200" dirty="0" err="1"/>
+              <a:t>vider</a:t>
+            </a:r>
+            <a:r>
+              <a:rPr lang="en-GB" sz="1200" dirty="0"/>
+              <a:t> </a:t>
+            </a:r>
+            <a:r>
+              <a:rPr lang="en-GB" sz="1200" dirty="0" err="1"/>
+              <a:t>entièrement</a:t>
+            </a:r>
+            <a:r>
+              <a:rPr lang="en-GB" sz="1200" dirty="0"/>
+              <a:t> </a:t>
+            </a:r>
+            <a:r>
+              <a:rPr lang="en-GB" sz="1200" dirty="0" err="1"/>
+              <a:t>mon</a:t>
+            </a:r>
+            <a:r>
+              <a:rPr lang="en-GB" sz="1200" dirty="0"/>
+              <a:t> panier </a:t>
+            </a:r>
+          </a:p>
+          <a:p>
+            <a:r>
+              <a:rPr lang="en-GB" sz="1200" dirty="0"/>
+              <a:t>- En tant </a:t>
+            </a:r>
+            <a:r>
+              <a:rPr lang="en-GB" sz="1200" dirty="0" err="1"/>
+              <a:t>que</a:t>
+            </a:r>
+            <a:r>
+              <a:rPr lang="en-GB" sz="1200" dirty="0"/>
+              <a:t> </a:t>
+            </a:r>
+            <a:r>
+              <a:rPr lang="en-GB" sz="1200" dirty="0" err="1"/>
+              <a:t>visiteur</a:t>
+            </a:r>
+            <a:r>
+              <a:rPr lang="en-GB" sz="1200" dirty="0"/>
+              <a:t>, </a:t>
+            </a:r>
+            <a:r>
+              <a:rPr lang="en-GB" sz="1200" dirty="0" err="1"/>
+              <a:t>mon</a:t>
+            </a:r>
+            <a:r>
+              <a:rPr lang="en-GB" sz="1200" dirty="0"/>
+              <a:t> panier </a:t>
+            </a:r>
+            <a:r>
+              <a:rPr lang="en-GB" sz="1200" dirty="0" err="1"/>
+              <a:t>persiste</a:t>
+            </a:r>
+            <a:r>
+              <a:rPr lang="en-GB" sz="1200" dirty="0"/>
+              <a:t> pendant ma session de navigation</a:t>
+            </a:r>
+          </a:p>
+          <a:p>
             <a:pPr marL="285750" indent="-285750">
               <a:buFontTx/>
               <a:buChar char="-"/>
             </a:pPr>
+            <a:endParaRPr lang="en-GB" sz="1200" dirty="0"/>
+          </a:p>
+          <a:p>
             <a:r>
               <a:rPr lang="en-GB" sz="1200" dirty="0"/>
-              <a:t> En tant </a:t>
-            </a:r>
-            <a:r>
-              <a:rPr lang="en-GB" sz="1200" dirty="0" err="1"/>
-              <a:t>que</a:t>
-            </a:r>
-            <a:r>
-              <a:rPr lang="en-GB" sz="1200" dirty="0"/>
-              <a:t> </a:t>
-            </a:r>
-            <a:r>
-              <a:rPr lang="en-GB" sz="1200" dirty="0" err="1"/>
-              <a:t>visiteur</a:t>
-            </a:r>
-            <a:r>
-              <a:rPr lang="en-GB" sz="1200" dirty="0"/>
-              <a:t>, je </a:t>
-            </a:r>
-            <a:r>
-              <a:rPr lang="en-GB" sz="1200" dirty="0" err="1"/>
-              <a:t>peux</a:t>
-            </a:r>
-            <a:r>
-              <a:rPr lang="en-GB" sz="1200" dirty="0"/>
-              <a:t> </a:t>
-            </a:r>
-            <a:r>
-              <a:rPr lang="en-GB" sz="1200" dirty="0" err="1"/>
-              <a:t>retirer</a:t>
-            </a:r>
-            <a:r>
-              <a:rPr lang="en-GB" sz="1200" dirty="0"/>
-              <a:t> un </a:t>
-            </a:r>
-            <a:r>
-              <a:rPr lang="en-GB" sz="1200" dirty="0" err="1"/>
-              <a:t>produit</a:t>
-            </a:r>
-            <a:r>
-              <a:rPr lang="en-GB" sz="1200" dirty="0"/>
-              <a:t> de </a:t>
-            </a:r>
-            <a:r>
-              <a:rPr lang="en-GB" sz="1200" dirty="0" err="1"/>
-              <a:t>mon</a:t>
-            </a:r>
-            <a:r>
-              <a:rPr lang="en-GB" sz="1200" dirty="0"/>
-              <a:t> panier </a:t>
+              <a:t>Information &amp; Communication</a:t>
             </a:r>
           </a:p>
           <a:p>
@@ -14049,7 +14180,7 @@
             </a:pPr>
             <a:r>
               <a:rPr lang="en-GB" sz="1200" dirty="0"/>
-              <a:t>-En tant </a:t>
+              <a:t>En tant </a:t>
             </a:r>
             <a:r>
               <a:rPr lang="en-GB" sz="1200" dirty="0" err="1"/>
@@ -14073,15 +14204,31 @@
             </a:r>
             <a:r>
               <a:rPr lang="en-GB" sz="1200" dirty="0"/>
-              <a:t> voir le total de </a:t>
+              <a:t> </a:t>
             </a:r>
             <a:r>
               <a:rPr lang="en-GB" sz="1200" dirty="0" err="1"/>
-              <a:t>mon</a:t>
+              <a:t>accéder</a:t>
             </a:r>
             <a:r>
               <a:rPr lang="en-GB" sz="1200" dirty="0"/>
-              <a:t> panier </a:t>
+              <a:t> à la page "À </a:t>
+            </a:r>
+            <a:r>
+              <a:rPr lang="en-GB" sz="1200" dirty="0" err="1"/>
+              <a:t>propos</a:t>
+            </a:r>
+            <a:r>
+              <a:rPr lang="en-GB" sz="1200" dirty="0"/>
+              <a:t>" pour </a:t>
+            </a:r>
+            <a:r>
+              <a:rPr lang="en-GB" sz="1200" dirty="0" err="1"/>
+              <a:t>en</a:t>
+            </a:r>
+            <a:r>
+              <a:rPr lang="en-GB" sz="1200" dirty="0"/>
+              <a:t> savoir plus sur le Comptoir Local </a:t>
             </a:r>
           </a:p>
           <a:p>
@@ -14091,7 +14238,7 @@
             </a:pPr>
             <a:r>
               <a:rPr lang="en-GB" sz="1200" dirty="0"/>
-              <a:t>-En tant </a:t>
+              <a:t>En tant </a:t>
             </a:r>
             <a:r>
               <a:rPr lang="en-GB" sz="1200" dirty="0" err="1"/>
@@ -14115,31 +14262,39 @@
             </a:r>
             <a:r>
               <a:rPr lang="en-GB" sz="1200" dirty="0"/>
-              <a:t> </a:t>
+              <a:t> voir les </a:t>
             </a:r>
             <a:r>
               <a:rPr lang="en-GB" sz="1200" dirty="0" err="1"/>
-              <a:t>vider</a:t>
+              <a:t>valeurs</a:t>
             </a:r>
             <a:r>
               <a:rPr lang="en-GB" sz="1200" dirty="0"/>
-              <a:t> </a:t>
+              <a:t> de </a:t>
             </a:r>
             <a:r>
               <a:rPr lang="en-GB" sz="1200" dirty="0" err="1"/>
-              <a:t>entièrement</a:t>
+              <a:t>l'entreprise</a:t>
             </a:r>
             <a:r>
               <a:rPr lang="en-GB" sz="1200" dirty="0"/>
-              <a:t> </a:t>
+              <a:t> (local, </a:t>
             </a:r>
             <a:r>
               <a:rPr lang="en-GB" sz="1200" dirty="0" err="1"/>
-              <a:t>mon</a:t>
+              <a:t>qualité</a:t>
             </a:r>
             <a:r>
               <a:rPr lang="en-GB" sz="1200" dirty="0"/>
-              <a:t> panier </a:t>
+              <a:t>,  </a:t>
+            </a:r>
+            <a:r>
+              <a:rPr lang="en-GB" sz="1200" dirty="0" err="1"/>
+              <a:t>transparence</a:t>
+            </a:r>
+            <a:r>
+              <a:rPr lang="en-GB" sz="1200" dirty="0"/>
+              <a:t>)</a:t>
             </a:r>
           </a:p>
           <a:p>
@@ -14149,179 +14304,7 @@
             </a:pPr>
             <a:r>
               <a:rPr lang="en-GB" sz="1200" dirty="0"/>
-              <a:t>-En tant </a:t>
-            </a:r>
-            <a:r>
-              <a:rPr lang="en-GB" sz="1200" dirty="0" err="1"/>
-              <a:t>que</a:t>
-            </a:r>
-            <a:r>
-              <a:rPr lang="en-GB" sz="1200" dirty="0"/>
-              <a:t> </a:t>
-            </a:r>
-            <a:r>
-              <a:rPr lang="en-GB" sz="1200" dirty="0" err="1"/>
-              <a:t>visiteur</a:t>
-            </a:r>
-            <a:r>
-              <a:rPr lang="en-GB" sz="1200" dirty="0"/>
-              <a:t>, </a:t>
-            </a:r>
-            <a:r>
-              <a:rPr lang="en-GB" sz="1200" dirty="0" err="1"/>
-              <a:t>mon</a:t>
-            </a:r>
-            <a:r>
-              <a:rPr lang="en-GB" sz="1200" dirty="0"/>
-              <a:t> panier </a:t>
-            </a:r>
-            <a:r>
-              <a:rPr lang="en-GB" sz="1200" dirty="0" err="1"/>
-              <a:t>persiste</a:t>
-            </a:r>
-            <a:r>
-              <a:rPr lang="en-GB" sz="1200" dirty="0"/>
-              <a:t> pendant ma session de navigation</a:t>
-            </a:r>
-          </a:p>
-          <a:p>
-            <a:r>
-              <a:rPr lang="en-GB" sz="1200" dirty="0"/>
-              <a:t>Information &amp; Communication</a:t>
-            </a:r>
-          </a:p>
-          <a:p>
-            <a:pPr marL="285750" indent="-285750">
-              <a:buFontTx/>
-              <a:buChar char="-"/>
-            </a:pPr>
-            <a:r>
-              <a:rPr lang="en-GB" sz="1200" dirty="0"/>
-              <a:t> En tant </a:t>
-            </a:r>
-            <a:r>
-              <a:rPr lang="en-GB" sz="1200" dirty="0" err="1"/>
-              <a:t>que</a:t>
-            </a:r>
-            <a:r>
-              <a:rPr lang="en-GB" sz="1200" dirty="0"/>
-              <a:t> </a:t>
-            </a:r>
-            <a:r>
-              <a:rPr lang="en-GB" sz="1200" dirty="0" err="1"/>
-              <a:t>visiteur</a:t>
-            </a:r>
-            <a:r>
-              <a:rPr lang="en-GB" sz="1200" dirty="0"/>
-              <a:t>, je </a:t>
-            </a:r>
-            <a:r>
-              <a:rPr lang="en-GB" sz="1200" dirty="0" err="1"/>
-              <a:t>peux</a:t>
-            </a:r>
-            <a:r>
-              <a:rPr lang="en-GB" sz="1200" dirty="0"/>
-              <a:t> </a:t>
-            </a:r>
-            <a:r>
-              <a:rPr lang="en-GB" sz="1200" dirty="0" err="1"/>
-              <a:t>accéder</a:t>
-            </a:r>
-            <a:r>
-              <a:rPr lang="en-GB" sz="1200" dirty="0"/>
-              <a:t> à la page "À </a:t>
-            </a:r>
-            <a:r>
-              <a:rPr lang="en-GB" sz="1200" dirty="0" err="1"/>
-              <a:t>propos</a:t>
-            </a:r>
-            <a:r>
-              <a:rPr lang="en-GB" sz="1200" dirty="0"/>
-              <a:t>" pour </a:t>
-            </a:r>
-            <a:r>
-              <a:rPr lang="en-GB" sz="1200" dirty="0" err="1"/>
-              <a:t>en</a:t>
-            </a:r>
-            <a:r>
-              <a:rPr lang="en-GB" sz="1200" dirty="0"/>
-              <a:t> savoir plus sur le Comptoir Local </a:t>
-            </a:r>
-          </a:p>
-          <a:p>
-            <a:pPr marL="285750" indent="-285750">
-              <a:buFontTx/>
-              <a:buChar char="-"/>
-            </a:pPr>
-            <a:r>
-              <a:rPr lang="en-GB" sz="1200" dirty="0"/>
-              <a:t>-En tant </a:t>
-            </a:r>
-            <a:r>
-              <a:rPr lang="en-GB" sz="1200" dirty="0" err="1"/>
-              <a:t>que</a:t>
-            </a:r>
-            <a:r>
-              <a:rPr lang="en-GB" sz="1200" dirty="0"/>
-              <a:t> </a:t>
-            </a:r>
-            <a:r>
-              <a:rPr lang="en-GB" sz="1200" dirty="0" err="1"/>
-              <a:t>visiteur</a:t>
-            </a:r>
-            <a:r>
-              <a:rPr lang="en-GB" sz="1200" dirty="0"/>
-              <a:t>, je </a:t>
-            </a:r>
-            <a:r>
-              <a:rPr lang="en-GB" sz="1200" dirty="0" err="1"/>
-              <a:t>peux</a:t>
-            </a:r>
-            <a:r>
-              <a:rPr lang="en-GB" sz="1200" dirty="0"/>
-              <a:t> voir les </a:t>
-            </a:r>
-            <a:r>
-              <a:rPr lang="en-GB" sz="1200" dirty="0" err="1"/>
-              <a:t>valeurs</a:t>
-            </a:r>
-            <a:r>
-              <a:rPr lang="en-GB" sz="1200" dirty="0"/>
-              <a:t> de </a:t>
-            </a:r>
-            <a:r>
-              <a:rPr lang="en-GB" sz="1200" dirty="0" err="1"/>
-              <a:t>l'entreprise</a:t>
-            </a:r>
-            <a:r>
-              <a:rPr lang="en-GB" sz="1200" dirty="0"/>
-              <a:t> (local, </a:t>
-            </a:r>
-            <a:r>
-              <a:rPr lang="en-GB" sz="1200" dirty="0" err="1"/>
-              <a:t>qualité</a:t>
-            </a:r>
-            <a:r>
-              <a:rPr lang="en-GB" sz="1200" dirty="0"/>
-              <a:t>, </a:t>
-            </a:r>
-            <a:r>
-              <a:rPr lang="en-GB" sz="1200" dirty="0" err="1"/>
-              <a:t>transparence</a:t>
-            </a:r>
-            <a:r>
-              <a:rPr lang="en-GB" sz="1200" dirty="0"/>
-              <a:t>) </a:t>
-            </a:r>
-          </a:p>
-          <a:p>
-            <a:pPr marL="285750" indent="-285750">
-              <a:buFontTx/>
-              <a:buChar char="-"/>
-            </a:pPr>
-            <a:r>
-              <a:rPr lang="en-GB" sz="1200" dirty="0"/>
-              <a:t>-En tant </a:t>
+              <a:t>En tant </a:t>
             </a:r>
             <a:r>
               <a:rPr lang="en-GB" sz="1200" dirty="0" err="1"/>
@@ -14553,35 +14536,75 @@
           <a:bodyPr/>
           <a:lstStyle/>
           <a:p>
-            <a:endParaRPr lang="en-FR" dirty="0"/>
+            <a:r>
+              <a:rPr lang="en-FR" dirty="0"/>
+              <a:t>MVP Initial : Sans Html</a:t>
+            </a:r>
           </a:p>
         </p:txBody>
       </p:sp>
-      <p:sp>
-        <p:nvSpPr>
-          <p:cNvPr id="3" name="Content Placeholder 2">
+      <p:pic>
+        <p:nvPicPr>
+          <p:cNvPr id="4" name="Content Placeholder 3">
             <a:extLst>
               <a:ext uri="{FF2B5EF4-FFF2-40B4-BE49-F238E27FC236}">
-                <a16:creationId xmlns:a16="http://schemas.microsoft.com/office/drawing/2014/main" id="{FD8DD056-27C8-064E-7E29-019BDDBDA571}"/>
+                <a16:creationId xmlns:a16="http://schemas.microsoft.com/office/drawing/2014/main" id="{F5407583-811C-4C18-2747-0EDA52320EE4}"/>
               </a:ext>
             </a:extLst>
           </p:cNvPr>
-          <p:cNvSpPr>
-            <a:spLocks noGrp="1"/>
-          </p:cNvSpPr>
+          <p:cNvPicPr>
+            <a:picLocks noGrp="1" noChangeAspect="1"/>
+          </p:cNvPicPr>
           <p:nvPr>
             <p:ph idx="1"/>
           </p:nvPr>
-        </p:nvSpPr>
-        <p:spPr/>
-        <p:txBody>
-          <a:bodyPr/>
-          <a:lstStyle/>
-          <a:p>
-            <a:endParaRPr lang="en-FR"/>
-          </a:p>
-        </p:txBody>
-      </p:sp>
+        </p:nvPicPr>
+        <p:blipFill>
+          <a:blip r:embed="rId2"/>
+          <a:stretch>
+            <a:fillRect/>
+          </a:stretch>
+        </p:blipFill>
+        <p:spPr>
+          <a:xfrm>
+            <a:off x="685800" y="2335086"/>
+            <a:ext cx="10131425" cy="3262566"/>
+          </a:xfrm>
+          <a:prstGeom prst="rect">
+            <a:avLst/>
+          </a:prstGeom>
+        </p:spPr>
+      </p:pic>
+      <p:pic>
+        <p:nvPicPr>
+          <p:cNvPr id="5" name="Picture 4">
+            <a:extLst>
+              <a:ext uri="{FF2B5EF4-FFF2-40B4-BE49-F238E27FC236}">
+                <a16:creationId xmlns:a16="http://schemas.microsoft.com/office/drawing/2014/main" id="{D2DC67EC-0C36-1E03-75DB-66D3AD4AE1CD}"/>
+              </a:ext>
+            </a:extLst>
+          </p:cNvPr>
+          <p:cNvPicPr>
+            <a:picLocks noChangeAspect="1"/>
+          </p:cNvPicPr>
+          <p:nvPr/>
+        </p:nvPicPr>
+        <p:blipFill>
+          <a:blip r:embed="rId3"/>
+          <a:stretch>
+            <a:fillRect/>
+          </a:stretch>
+        </p:blipFill>
+        <p:spPr>
+          <a:xfrm>
+            <a:off x="2739190" y="1466247"/>
+            <a:ext cx="7772400" cy="2500122"/>
+          </a:xfrm>
+          <a:prstGeom prst="rect">
+            <a:avLst/>
+          </a:prstGeom>
+        </p:spPr>
+      </p:pic>
     </p:spTree>
     <p:extLst>
       <p:ext uri="{BB962C8B-B14F-4D97-AF65-F5344CB8AC3E}">

</xml_diff>

<commit_message>
[week1] Added images for Products
</commit_message>
<xml_diff>
--- a/week1/saclay_local/WorkingDocs/presentation.pptx
+++ b/week1/saclay_local/WorkingDocs/presentation.pptx
@@ -5,7 +5,7 @@
     <p:sldMasterId id="2147483762" r:id="rId1"/>
   </p:sldMasterIdLst>
   <p:notesMasterIdLst>
-    <p:notesMasterId r:id="rId12"/>
+    <p:notesMasterId r:id="rId21"/>
   </p:notesMasterIdLst>
   <p:sldIdLst>
     <p:sldId id="256" r:id="rId2"/>
@@ -16,8 +16,17 @@
     <p:sldId id="263" r:id="rId7"/>
     <p:sldId id="264" r:id="rId8"/>
     <p:sldId id="265" r:id="rId9"/>
-    <p:sldId id="266" r:id="rId10"/>
-    <p:sldId id="257" r:id="rId11"/>
+    <p:sldId id="268" r:id="rId10"/>
+    <p:sldId id="269" r:id="rId11"/>
+    <p:sldId id="266" r:id="rId12"/>
+    <p:sldId id="271" r:id="rId13"/>
+    <p:sldId id="273" r:id="rId14"/>
+    <p:sldId id="274" r:id="rId15"/>
+    <p:sldId id="275" r:id="rId16"/>
+    <p:sldId id="272" r:id="rId17"/>
+    <p:sldId id="267" r:id="rId18"/>
+    <p:sldId id="270" r:id="rId19"/>
+    <p:sldId id="257" r:id="rId20"/>
   </p:sldIdLst>
   <p:sldSz cx="12192000" cy="6858000"/>
   <p:notesSz cx="6858000" cy="9144000"/>
@@ -122,7 +131,7 @@
 <file path=ppt/revisionInfo.xml><?xml version="1.0" encoding="utf-8"?>
 <p1510:revInfo xmlns:a="http://schemas.openxmlformats.org/drawingml/2006/main" xmlns:r="http://schemas.openxmlformats.org/officeDocument/2006/relationships" xmlns:p1510="http://schemas.microsoft.com/office/powerpoint/2015/10/main">
   <p1510:revLst>
-    <p1510:client id="{092E5D2B-4EBD-AF4D-AD6C-38A70AC5E8FC}" v="58" dt="2025-11-14T10:00:17.284"/>
+    <p1510:client id="{092E5D2B-4EBD-AF4D-AD6C-38A70AC5E8FC}" v="85" dt="2025-11-14T10:32:57.435"/>
   </p1510:revLst>
 </p1510:revInfo>
 </file>
@@ -744,6 +753,414 @@
     <p:extLst>
       <p:ext uri="{BB962C8B-B14F-4D97-AF65-F5344CB8AC3E}">
         <p14:creationId xmlns:p14="http://schemas.microsoft.com/office/powerpoint/2010/main" val="2663328668"/>
+      </p:ext>
+    </p:extLst>
+  </p:cSld>
+  <p:clrMapOvr>
+    <a:masterClrMapping/>
+  </p:clrMapOvr>
+</p:notes>
+</file>
+
+<file path=ppt/notesSlides/notesSlide4.xml><?xml version="1.0" encoding="utf-8"?>
+<p:notes xmlns:a="http://schemas.openxmlformats.org/drawingml/2006/main" xmlns:r="http://schemas.openxmlformats.org/officeDocument/2006/relationships" xmlns:p="http://schemas.openxmlformats.org/presentationml/2006/main">
+  <p:cSld>
+    <p:spTree>
+      <p:nvGrpSpPr>
+        <p:cNvPr id="1" name=""/>
+        <p:cNvGrpSpPr/>
+        <p:nvPr/>
+      </p:nvGrpSpPr>
+      <p:grpSpPr>
+        <a:xfrm>
+          <a:off x="0" y="0"/>
+          <a:ext cx="0" cy="0"/>
+          <a:chOff x="0" y="0"/>
+          <a:chExt cx="0" cy="0"/>
+        </a:xfrm>
+      </p:grpSpPr>
+      <p:sp>
+        <p:nvSpPr>
+          <p:cNvPr id="2" name="Slide Image Placeholder 1"/>
+          <p:cNvSpPr>
+            <a:spLocks noGrp="1" noRot="1" noChangeAspect="1"/>
+          </p:cNvSpPr>
+          <p:nvPr>
+            <p:ph type="sldImg"/>
+          </p:nvPr>
+        </p:nvSpPr>
+        <p:spPr/>
+      </p:sp>
+      <p:sp>
+        <p:nvSpPr>
+          <p:cNvPr id="3" name="Notes Placeholder 2"/>
+          <p:cNvSpPr>
+            <a:spLocks noGrp="1"/>
+          </p:cNvSpPr>
+          <p:nvPr>
+            <p:ph type="body" idx="1"/>
+          </p:nvPr>
+        </p:nvSpPr>
+        <p:spPr/>
+        <p:txBody>
+          <a:bodyPr/>
+          <a:lstStyle/>
+          <a:p>
+            <a:endParaRPr lang="en-FR" dirty="0"/>
+          </a:p>
+        </p:txBody>
+      </p:sp>
+      <p:sp>
+        <p:nvSpPr>
+          <p:cNvPr id="4" name="Slide Number Placeholder 3"/>
+          <p:cNvSpPr>
+            <a:spLocks noGrp="1"/>
+          </p:cNvSpPr>
+          <p:nvPr>
+            <p:ph type="sldNum" sz="quarter" idx="5"/>
+          </p:nvPr>
+        </p:nvSpPr>
+        <p:spPr/>
+        <p:txBody>
+          <a:bodyPr/>
+          <a:lstStyle/>
+          <a:p>
+            <a:fld id="{A4959839-6839-7942-94F2-689C77123860}" type="slidenum">
+              <a:rPr lang="en-FR" smtClean="0"/>
+              <a:t>9</a:t>
+            </a:fld>
+            <a:endParaRPr lang="en-FR"/>
+          </a:p>
+        </p:txBody>
+      </p:sp>
+    </p:spTree>
+    <p:extLst>
+      <p:ext uri="{BB962C8B-B14F-4D97-AF65-F5344CB8AC3E}">
+        <p14:creationId xmlns:p14="http://schemas.microsoft.com/office/powerpoint/2010/main" val="2031194966"/>
+      </p:ext>
+    </p:extLst>
+  </p:cSld>
+  <p:clrMapOvr>
+    <a:masterClrMapping/>
+  </p:clrMapOvr>
+</p:notes>
+</file>
+
+<file path=ppt/notesSlides/notesSlide5.xml><?xml version="1.0" encoding="utf-8"?>
+<p:notes xmlns:a="http://schemas.openxmlformats.org/drawingml/2006/main" xmlns:r="http://schemas.openxmlformats.org/officeDocument/2006/relationships" xmlns:p="http://schemas.openxmlformats.org/presentationml/2006/main">
+  <p:cSld>
+    <p:spTree>
+      <p:nvGrpSpPr>
+        <p:cNvPr id="1" name="">
+          <a:extLst>
+            <a:ext uri="{FF2B5EF4-FFF2-40B4-BE49-F238E27FC236}">
+              <a16:creationId xmlns:a16="http://schemas.microsoft.com/office/drawing/2014/main" id="{A61699AC-D76E-CE5F-DA66-A0AB10216351}"/>
+            </a:ext>
+          </a:extLst>
+        </p:cNvPr>
+        <p:cNvGrpSpPr/>
+        <p:nvPr/>
+      </p:nvGrpSpPr>
+      <p:grpSpPr>
+        <a:xfrm>
+          <a:off x="0" y="0"/>
+          <a:ext cx="0" cy="0"/>
+          <a:chOff x="0" y="0"/>
+          <a:chExt cx="0" cy="0"/>
+        </a:xfrm>
+      </p:grpSpPr>
+      <p:sp>
+        <p:nvSpPr>
+          <p:cNvPr id="2" name="Slide Image Placeholder 1">
+            <a:extLst>
+              <a:ext uri="{FF2B5EF4-FFF2-40B4-BE49-F238E27FC236}">
+                <a16:creationId xmlns:a16="http://schemas.microsoft.com/office/drawing/2014/main" id="{5A65ECFE-3A99-D1AE-E024-19230412D757}"/>
+              </a:ext>
+            </a:extLst>
+          </p:cNvPr>
+          <p:cNvSpPr>
+            <a:spLocks noGrp="1" noRot="1" noChangeAspect="1"/>
+          </p:cNvSpPr>
+          <p:nvPr>
+            <p:ph type="sldImg"/>
+          </p:nvPr>
+        </p:nvSpPr>
+        <p:spPr/>
+      </p:sp>
+      <p:sp>
+        <p:nvSpPr>
+          <p:cNvPr id="3" name="Notes Placeholder 2">
+            <a:extLst>
+              <a:ext uri="{FF2B5EF4-FFF2-40B4-BE49-F238E27FC236}">
+                <a16:creationId xmlns:a16="http://schemas.microsoft.com/office/drawing/2014/main" id="{8588FEF3-82F0-6C19-4721-D8C9CF30907F}"/>
+              </a:ext>
+            </a:extLst>
+          </p:cNvPr>
+          <p:cNvSpPr>
+            <a:spLocks noGrp="1"/>
+          </p:cNvSpPr>
+          <p:nvPr>
+            <p:ph type="body" idx="1"/>
+          </p:nvPr>
+        </p:nvSpPr>
+        <p:spPr/>
+        <p:txBody>
+          <a:bodyPr/>
+          <a:lstStyle/>
+          <a:p>
+            <a:endParaRPr lang="en-FR" dirty="0"/>
+          </a:p>
+        </p:txBody>
+      </p:sp>
+      <p:sp>
+        <p:nvSpPr>
+          <p:cNvPr id="4" name="Slide Number Placeholder 3">
+            <a:extLst>
+              <a:ext uri="{FF2B5EF4-FFF2-40B4-BE49-F238E27FC236}">
+                <a16:creationId xmlns:a16="http://schemas.microsoft.com/office/drawing/2014/main" id="{A36AD5A8-15AA-6785-D180-31DEE50B0A70}"/>
+              </a:ext>
+            </a:extLst>
+          </p:cNvPr>
+          <p:cNvSpPr>
+            <a:spLocks noGrp="1"/>
+          </p:cNvSpPr>
+          <p:nvPr>
+            <p:ph type="sldNum" sz="quarter" idx="5"/>
+          </p:nvPr>
+        </p:nvSpPr>
+        <p:spPr/>
+        <p:txBody>
+          <a:bodyPr/>
+          <a:lstStyle/>
+          <a:p>
+            <a:fld id="{A4959839-6839-7942-94F2-689C77123860}" type="slidenum">
+              <a:rPr lang="en-FR" smtClean="0"/>
+              <a:t>10</a:t>
+            </a:fld>
+            <a:endParaRPr lang="en-FR"/>
+          </a:p>
+        </p:txBody>
+      </p:sp>
+    </p:spTree>
+    <p:extLst>
+      <p:ext uri="{BB962C8B-B14F-4D97-AF65-F5344CB8AC3E}">
+        <p14:creationId xmlns:p14="http://schemas.microsoft.com/office/powerpoint/2010/main" val="797464608"/>
+      </p:ext>
+    </p:extLst>
+  </p:cSld>
+  <p:clrMapOvr>
+    <a:masterClrMapping/>
+  </p:clrMapOvr>
+</p:notes>
+</file>
+
+<file path=ppt/notesSlides/notesSlide6.xml><?xml version="1.0" encoding="utf-8"?>
+<p:notes xmlns:a="http://schemas.openxmlformats.org/drawingml/2006/main" xmlns:r="http://schemas.openxmlformats.org/officeDocument/2006/relationships" xmlns:p="http://schemas.openxmlformats.org/presentationml/2006/main">
+  <p:cSld>
+    <p:spTree>
+      <p:nvGrpSpPr>
+        <p:cNvPr id="1" name="">
+          <a:extLst>
+            <a:ext uri="{FF2B5EF4-FFF2-40B4-BE49-F238E27FC236}">
+              <a16:creationId xmlns:a16="http://schemas.microsoft.com/office/drawing/2014/main" id="{E3058415-1C59-17DE-FFD4-39647AC86E95}"/>
+            </a:ext>
+          </a:extLst>
+        </p:cNvPr>
+        <p:cNvGrpSpPr/>
+        <p:nvPr/>
+      </p:nvGrpSpPr>
+      <p:grpSpPr>
+        <a:xfrm>
+          <a:off x="0" y="0"/>
+          <a:ext cx="0" cy="0"/>
+          <a:chOff x="0" y="0"/>
+          <a:chExt cx="0" cy="0"/>
+        </a:xfrm>
+      </p:grpSpPr>
+      <p:sp>
+        <p:nvSpPr>
+          <p:cNvPr id="2" name="Slide Image Placeholder 1">
+            <a:extLst>
+              <a:ext uri="{FF2B5EF4-FFF2-40B4-BE49-F238E27FC236}">
+                <a16:creationId xmlns:a16="http://schemas.microsoft.com/office/drawing/2014/main" id="{9CB7D41F-980F-16A6-F06D-D4B6373AC4FF}"/>
+              </a:ext>
+            </a:extLst>
+          </p:cNvPr>
+          <p:cNvSpPr>
+            <a:spLocks noGrp="1" noRot="1" noChangeAspect="1"/>
+          </p:cNvSpPr>
+          <p:nvPr>
+            <p:ph type="sldImg"/>
+          </p:nvPr>
+        </p:nvSpPr>
+        <p:spPr/>
+      </p:sp>
+      <p:sp>
+        <p:nvSpPr>
+          <p:cNvPr id="3" name="Notes Placeholder 2">
+            <a:extLst>
+              <a:ext uri="{FF2B5EF4-FFF2-40B4-BE49-F238E27FC236}">
+                <a16:creationId xmlns:a16="http://schemas.microsoft.com/office/drawing/2014/main" id="{D6C1C3C7-A4CA-FBDE-44FA-F1981C157159}"/>
+              </a:ext>
+            </a:extLst>
+          </p:cNvPr>
+          <p:cNvSpPr>
+            <a:spLocks noGrp="1"/>
+          </p:cNvSpPr>
+          <p:nvPr>
+            <p:ph type="body" idx="1"/>
+          </p:nvPr>
+        </p:nvSpPr>
+        <p:spPr/>
+        <p:txBody>
+          <a:bodyPr/>
+          <a:lstStyle/>
+          <a:p>
+            <a:endParaRPr lang="en-FR" dirty="0"/>
+          </a:p>
+        </p:txBody>
+      </p:sp>
+      <p:sp>
+        <p:nvSpPr>
+          <p:cNvPr id="4" name="Slide Number Placeholder 3">
+            <a:extLst>
+              <a:ext uri="{FF2B5EF4-FFF2-40B4-BE49-F238E27FC236}">
+                <a16:creationId xmlns:a16="http://schemas.microsoft.com/office/drawing/2014/main" id="{60967EEA-83B6-FFF6-337F-8C2C860EB11B}"/>
+              </a:ext>
+            </a:extLst>
+          </p:cNvPr>
+          <p:cNvSpPr>
+            <a:spLocks noGrp="1"/>
+          </p:cNvSpPr>
+          <p:nvPr>
+            <p:ph type="sldNum" sz="quarter" idx="5"/>
+          </p:nvPr>
+        </p:nvSpPr>
+        <p:spPr/>
+        <p:txBody>
+          <a:bodyPr/>
+          <a:lstStyle/>
+          <a:p>
+            <a:fld id="{A4959839-6839-7942-94F2-689C77123860}" type="slidenum">
+              <a:rPr lang="en-FR" smtClean="0"/>
+              <a:t>14</a:t>
+            </a:fld>
+            <a:endParaRPr lang="en-FR"/>
+          </a:p>
+        </p:txBody>
+      </p:sp>
+    </p:spTree>
+    <p:extLst>
+      <p:ext uri="{BB962C8B-B14F-4D97-AF65-F5344CB8AC3E}">
+        <p14:creationId xmlns:p14="http://schemas.microsoft.com/office/powerpoint/2010/main" val="264954531"/>
+      </p:ext>
+    </p:extLst>
+  </p:cSld>
+  <p:clrMapOvr>
+    <a:masterClrMapping/>
+  </p:clrMapOvr>
+</p:notes>
+</file>
+
+<file path=ppt/notesSlides/notesSlide7.xml><?xml version="1.0" encoding="utf-8"?>
+<p:notes xmlns:a="http://schemas.openxmlformats.org/drawingml/2006/main" xmlns:r="http://schemas.openxmlformats.org/officeDocument/2006/relationships" xmlns:p="http://schemas.openxmlformats.org/presentationml/2006/main">
+  <p:cSld>
+    <p:spTree>
+      <p:nvGrpSpPr>
+        <p:cNvPr id="1" name="">
+          <a:extLst>
+            <a:ext uri="{FF2B5EF4-FFF2-40B4-BE49-F238E27FC236}">
+              <a16:creationId xmlns:a16="http://schemas.microsoft.com/office/drawing/2014/main" id="{36AD3AF0-1F40-8B74-272A-9747A82B4223}"/>
+            </a:ext>
+          </a:extLst>
+        </p:cNvPr>
+        <p:cNvGrpSpPr/>
+        <p:nvPr/>
+      </p:nvGrpSpPr>
+      <p:grpSpPr>
+        <a:xfrm>
+          <a:off x="0" y="0"/>
+          <a:ext cx="0" cy="0"/>
+          <a:chOff x="0" y="0"/>
+          <a:chExt cx="0" cy="0"/>
+        </a:xfrm>
+      </p:grpSpPr>
+      <p:sp>
+        <p:nvSpPr>
+          <p:cNvPr id="2" name="Slide Image Placeholder 1">
+            <a:extLst>
+              <a:ext uri="{FF2B5EF4-FFF2-40B4-BE49-F238E27FC236}">
+                <a16:creationId xmlns:a16="http://schemas.microsoft.com/office/drawing/2014/main" id="{19BBA93C-9458-B79E-0414-539398A84AC2}"/>
+              </a:ext>
+            </a:extLst>
+          </p:cNvPr>
+          <p:cNvSpPr>
+            <a:spLocks noGrp="1" noRot="1" noChangeAspect="1"/>
+          </p:cNvSpPr>
+          <p:nvPr>
+            <p:ph type="sldImg"/>
+          </p:nvPr>
+        </p:nvSpPr>
+        <p:spPr/>
+      </p:sp>
+      <p:sp>
+        <p:nvSpPr>
+          <p:cNvPr id="3" name="Notes Placeholder 2">
+            <a:extLst>
+              <a:ext uri="{FF2B5EF4-FFF2-40B4-BE49-F238E27FC236}">
+                <a16:creationId xmlns:a16="http://schemas.microsoft.com/office/drawing/2014/main" id="{D2D5C9AF-3A7F-9F45-C143-F08D6D456C51}"/>
+              </a:ext>
+            </a:extLst>
+          </p:cNvPr>
+          <p:cNvSpPr>
+            <a:spLocks noGrp="1"/>
+          </p:cNvSpPr>
+          <p:nvPr>
+            <p:ph type="body" idx="1"/>
+          </p:nvPr>
+        </p:nvSpPr>
+        <p:spPr/>
+        <p:txBody>
+          <a:bodyPr/>
+          <a:lstStyle/>
+          <a:p>
+            <a:endParaRPr lang="en-FR" dirty="0"/>
+          </a:p>
+        </p:txBody>
+      </p:sp>
+      <p:sp>
+        <p:nvSpPr>
+          <p:cNvPr id="4" name="Slide Number Placeholder 3">
+            <a:extLst>
+              <a:ext uri="{FF2B5EF4-FFF2-40B4-BE49-F238E27FC236}">
+                <a16:creationId xmlns:a16="http://schemas.microsoft.com/office/drawing/2014/main" id="{8F88E50F-8401-6AB9-F6C2-0CC3B4B5FD03}"/>
+              </a:ext>
+            </a:extLst>
+          </p:cNvPr>
+          <p:cNvSpPr>
+            <a:spLocks noGrp="1"/>
+          </p:cNvSpPr>
+          <p:nvPr>
+            <p:ph type="sldNum" sz="quarter" idx="5"/>
+          </p:nvPr>
+        </p:nvSpPr>
+        <p:spPr/>
+        <p:txBody>
+          <a:bodyPr/>
+          <a:lstStyle/>
+          <a:p>
+            <a:fld id="{A4959839-6839-7942-94F2-689C77123860}" type="slidenum">
+              <a:rPr lang="en-FR" smtClean="0"/>
+              <a:t>15</a:t>
+            </a:fld>
+            <a:endParaRPr lang="en-FR"/>
+          </a:p>
+        </p:txBody>
+      </p:sp>
+    </p:spTree>
+    <p:extLst>
+      <p:ext uri="{BB962C8B-B14F-4D97-AF65-F5344CB8AC3E}">
+        <p14:creationId xmlns:p14="http://schemas.microsoft.com/office/powerpoint/2010/main" val="753525090"/>
       </p:ext>
     </p:extLst>
   </p:cSld>
@@ -11224,6 +11641,3199 @@
   <p:cSld>
     <p:spTree>
       <p:nvGrpSpPr>
+        <p:cNvPr id="1" name="">
+          <a:extLst>
+            <a:ext uri="{FF2B5EF4-FFF2-40B4-BE49-F238E27FC236}">
+              <a16:creationId xmlns:a16="http://schemas.microsoft.com/office/drawing/2014/main" id="{661D6C98-E56A-FD97-DA3D-DDE0A65C4235}"/>
+            </a:ext>
+          </a:extLst>
+        </p:cNvPr>
+        <p:cNvGrpSpPr/>
+        <p:nvPr/>
+      </p:nvGrpSpPr>
+      <p:grpSpPr>
+        <a:xfrm>
+          <a:off x="0" y="0"/>
+          <a:ext cx="0" cy="0"/>
+          <a:chOff x="0" y="0"/>
+          <a:chExt cx="0" cy="0"/>
+        </a:xfrm>
+      </p:grpSpPr>
+      <p:sp>
+        <p:nvSpPr>
+          <p:cNvPr id="2" name="Title 1">
+            <a:extLst>
+              <a:ext uri="{FF2B5EF4-FFF2-40B4-BE49-F238E27FC236}">
+                <a16:creationId xmlns:a16="http://schemas.microsoft.com/office/drawing/2014/main" id="{2C29A753-FFA9-A7C8-5473-176CEF3A4158}"/>
+              </a:ext>
+            </a:extLst>
+          </p:cNvPr>
+          <p:cNvSpPr>
+            <a:spLocks noGrp="1"/>
+          </p:cNvSpPr>
+          <p:nvPr>
+            <p:ph type="title"/>
+          </p:nvPr>
+        </p:nvSpPr>
+        <p:spPr>
+          <a:xfrm>
+            <a:off x="465221" y="2424139"/>
+            <a:ext cx="4660232" cy="1456267"/>
+          </a:xfrm>
+        </p:spPr>
+        <p:txBody>
+          <a:bodyPr/>
+          <a:lstStyle/>
+          <a:p>
+            <a:r>
+              <a:rPr lang="en-FR" dirty="0"/>
+              <a:t>WEEK 1 – SPRINT 2 - Modèle</a:t>
+            </a:r>
+          </a:p>
+        </p:txBody>
+      </p:sp>
+      <p:pic>
+        <p:nvPicPr>
+          <p:cNvPr id="3" name="Picture 2">
+            <a:extLst>
+              <a:ext uri="{FF2B5EF4-FFF2-40B4-BE49-F238E27FC236}">
+                <a16:creationId xmlns:a16="http://schemas.microsoft.com/office/drawing/2014/main" id="{21447013-910D-712B-FB4C-3F729A00B0E3}"/>
+              </a:ext>
+            </a:extLst>
+          </p:cNvPr>
+          <p:cNvPicPr>
+            <a:picLocks noChangeAspect="1"/>
+          </p:cNvPicPr>
+          <p:nvPr/>
+        </p:nvPicPr>
+        <p:blipFill>
+          <a:blip r:embed="rId3"/>
+          <a:srcRect t="5263" b="32105"/>
+          <a:stretch>
+            <a:fillRect/>
+          </a:stretch>
+        </p:blipFill>
+        <p:spPr>
+          <a:xfrm>
+            <a:off x="5386387" y="0"/>
+            <a:ext cx="6151897" cy="6849833"/>
+          </a:xfrm>
+          <a:prstGeom prst="rect">
+            <a:avLst/>
+          </a:prstGeom>
+        </p:spPr>
+      </p:pic>
+    </p:spTree>
+    <p:extLst>
+      <p:ext uri="{BB962C8B-B14F-4D97-AF65-F5344CB8AC3E}">
+        <p14:creationId xmlns:p14="http://schemas.microsoft.com/office/powerpoint/2010/main" val="1407564398"/>
+      </p:ext>
+    </p:extLst>
+  </p:cSld>
+  <p:clrMapOvr>
+    <a:masterClrMapping/>
+  </p:clrMapOvr>
+</p:sld>
+</file>
+
+<file path=ppt/slides/slide11.xml><?xml version="1.0" encoding="utf-8"?>
+<p:sld xmlns:a="http://schemas.openxmlformats.org/drawingml/2006/main" xmlns:r="http://schemas.openxmlformats.org/officeDocument/2006/relationships" xmlns:p="http://schemas.openxmlformats.org/presentationml/2006/main">
+  <p:cSld>
+    <p:spTree>
+      <p:nvGrpSpPr>
+        <p:cNvPr id="1" name=""/>
+        <p:cNvGrpSpPr/>
+        <p:nvPr/>
+      </p:nvGrpSpPr>
+      <p:grpSpPr>
+        <a:xfrm>
+          <a:off x="0" y="0"/>
+          <a:ext cx="0" cy="0"/>
+          <a:chOff x="0" y="0"/>
+          <a:chExt cx="0" cy="0"/>
+        </a:xfrm>
+      </p:grpSpPr>
+      <p:sp>
+        <p:nvSpPr>
+          <p:cNvPr id="2" name="Title 1">
+            <a:extLst>
+              <a:ext uri="{FF2B5EF4-FFF2-40B4-BE49-F238E27FC236}">
+                <a16:creationId xmlns:a16="http://schemas.microsoft.com/office/drawing/2014/main" id="{FC891427-2D6B-161E-3541-2956F266AE3D}"/>
+              </a:ext>
+            </a:extLst>
+          </p:cNvPr>
+          <p:cNvSpPr>
+            <a:spLocks noGrp="1"/>
+          </p:cNvSpPr>
+          <p:nvPr>
+            <p:ph type="title"/>
+          </p:nvPr>
+        </p:nvSpPr>
+        <p:spPr>
+          <a:xfrm>
+            <a:off x="1110915" y="133124"/>
+            <a:ext cx="10131425" cy="1456267"/>
+          </a:xfrm>
+        </p:spPr>
+        <p:txBody>
+          <a:bodyPr/>
+          <a:lstStyle/>
+          <a:p>
+            <a:r>
+              <a:rPr lang="en-FR" dirty="0"/>
+              <a:t>WEEK 1 - MVP Initial : Sans Html</a:t>
+            </a:r>
+          </a:p>
+        </p:txBody>
+      </p:sp>
+      <p:pic>
+        <p:nvPicPr>
+          <p:cNvPr id="4" name="Content Placeholder 3">
+            <a:extLst>
+              <a:ext uri="{FF2B5EF4-FFF2-40B4-BE49-F238E27FC236}">
+                <a16:creationId xmlns:a16="http://schemas.microsoft.com/office/drawing/2014/main" id="{F5407583-811C-4C18-2747-0EDA52320EE4}"/>
+              </a:ext>
+            </a:extLst>
+          </p:cNvPr>
+          <p:cNvPicPr>
+            <a:picLocks noGrp="1" noChangeAspect="1"/>
+          </p:cNvPicPr>
+          <p:nvPr>
+            <p:ph idx="1"/>
+          </p:nvPr>
+        </p:nvPicPr>
+        <p:blipFill>
+          <a:blip r:embed="rId2"/>
+          <a:srcRect r="64136"/>
+          <a:stretch>
+            <a:fillRect/>
+          </a:stretch>
+        </p:blipFill>
+        <p:spPr>
+          <a:xfrm>
+            <a:off x="481263" y="1589391"/>
+            <a:ext cx="5000554" cy="4490015"/>
+          </a:xfrm>
+          <a:prstGeom prst="rect">
+            <a:avLst/>
+          </a:prstGeom>
+        </p:spPr>
+      </p:pic>
+      <p:pic>
+        <p:nvPicPr>
+          <p:cNvPr id="5" name="Picture 4">
+            <a:extLst>
+              <a:ext uri="{FF2B5EF4-FFF2-40B4-BE49-F238E27FC236}">
+                <a16:creationId xmlns:a16="http://schemas.microsoft.com/office/drawing/2014/main" id="{D2DC67EC-0C36-1E03-75DB-66D3AD4AE1CD}"/>
+              </a:ext>
+            </a:extLst>
+          </p:cNvPr>
+          <p:cNvPicPr>
+            <a:picLocks noChangeAspect="1"/>
+          </p:cNvPicPr>
+          <p:nvPr/>
+        </p:nvPicPr>
+        <p:blipFill>
+          <a:blip r:embed="rId3"/>
+          <a:srcRect r="67131"/>
+          <a:stretch>
+            <a:fillRect/>
+          </a:stretch>
+        </p:blipFill>
+        <p:spPr>
+          <a:xfrm>
+            <a:off x="6493043" y="1589391"/>
+            <a:ext cx="4588042" cy="4490015"/>
+          </a:xfrm>
+          <a:prstGeom prst="rect">
+            <a:avLst/>
+          </a:prstGeom>
+        </p:spPr>
+      </p:pic>
+    </p:spTree>
+    <p:extLst>
+      <p:ext uri="{BB962C8B-B14F-4D97-AF65-F5344CB8AC3E}">
+        <p14:creationId xmlns:p14="http://schemas.microsoft.com/office/powerpoint/2010/main" val="1571056947"/>
+      </p:ext>
+    </p:extLst>
+  </p:cSld>
+  <p:clrMapOvr>
+    <a:masterClrMapping/>
+  </p:clrMapOvr>
+</p:sld>
+</file>
+
+<file path=ppt/slides/slide12.xml><?xml version="1.0" encoding="utf-8"?>
+<p:sld xmlns:a="http://schemas.openxmlformats.org/drawingml/2006/main" xmlns:r="http://schemas.openxmlformats.org/officeDocument/2006/relationships" xmlns:p="http://schemas.openxmlformats.org/presentationml/2006/main">
+  <p:cSld>
+    <p:spTree>
+      <p:nvGrpSpPr>
+        <p:cNvPr id="1" name=""/>
+        <p:cNvGrpSpPr/>
+        <p:nvPr/>
+      </p:nvGrpSpPr>
+      <p:grpSpPr>
+        <a:xfrm>
+          <a:off x="0" y="0"/>
+          <a:ext cx="0" cy="0"/>
+          <a:chOff x="0" y="0"/>
+          <a:chExt cx="0" cy="0"/>
+        </a:xfrm>
+      </p:grpSpPr>
+      <p:sp>
+        <p:nvSpPr>
+          <p:cNvPr id="2" name="Title 1">
+            <a:extLst>
+              <a:ext uri="{FF2B5EF4-FFF2-40B4-BE49-F238E27FC236}">
+                <a16:creationId xmlns:a16="http://schemas.microsoft.com/office/drawing/2014/main" id="{E0DA9590-809E-A54E-76F2-B1C34815B44A}"/>
+              </a:ext>
+            </a:extLst>
+          </p:cNvPr>
+          <p:cNvSpPr>
+            <a:spLocks noGrp="1"/>
+          </p:cNvSpPr>
+          <p:nvPr>
+            <p:ph type="title"/>
+          </p:nvPr>
+        </p:nvSpPr>
+        <p:spPr/>
+        <p:txBody>
+          <a:bodyPr/>
+          <a:lstStyle/>
+          <a:p>
+            <a:r>
+              <a:rPr lang="en-FR" dirty="0"/>
+              <a:t>WEEK 1 – P</a:t>
+            </a:r>
+            <a:r>
+              <a:rPr lang="en-GB" dirty="0"/>
+              <a:t>r</a:t>
+            </a:r>
+            <a:r>
+              <a:rPr lang="en-FR" dirty="0"/>
+              <a:t>oduit final</a:t>
+            </a:r>
+          </a:p>
+        </p:txBody>
+      </p:sp>
+      <p:sp>
+        <p:nvSpPr>
+          <p:cNvPr id="3" name="Content Placeholder 2">
+            <a:extLst>
+              <a:ext uri="{FF2B5EF4-FFF2-40B4-BE49-F238E27FC236}">
+                <a16:creationId xmlns:a16="http://schemas.microsoft.com/office/drawing/2014/main" id="{2AF39BC2-818A-A3C4-463C-0178F6228998}"/>
+              </a:ext>
+            </a:extLst>
+          </p:cNvPr>
+          <p:cNvSpPr>
+            <a:spLocks noGrp="1"/>
+          </p:cNvSpPr>
+          <p:nvPr>
+            <p:ph idx="1"/>
+          </p:nvPr>
+        </p:nvSpPr>
+        <p:spPr/>
+        <p:txBody>
+          <a:bodyPr/>
+          <a:lstStyle/>
+          <a:p>
+            <a:endParaRPr lang="en-FR" dirty="0"/>
+          </a:p>
+        </p:txBody>
+      </p:sp>
+    </p:spTree>
+    <p:extLst>
+      <p:ext uri="{BB962C8B-B14F-4D97-AF65-F5344CB8AC3E}">
+        <p14:creationId xmlns:p14="http://schemas.microsoft.com/office/powerpoint/2010/main" val="796848103"/>
+      </p:ext>
+    </p:extLst>
+  </p:cSld>
+  <p:clrMapOvr>
+    <a:masterClrMapping/>
+  </p:clrMapOvr>
+</p:sld>
+</file>
+
+<file path=ppt/slides/slide13.xml><?xml version="1.0" encoding="utf-8"?>
+<p:sld xmlns:a="http://schemas.openxmlformats.org/drawingml/2006/main" xmlns:r="http://schemas.openxmlformats.org/officeDocument/2006/relationships" xmlns:p="http://schemas.openxmlformats.org/presentationml/2006/main">
+  <p:cSld>
+    <p:spTree>
+      <p:nvGrpSpPr>
+        <p:cNvPr id="1" name="">
+          <a:extLst>
+            <a:ext uri="{FF2B5EF4-FFF2-40B4-BE49-F238E27FC236}">
+              <a16:creationId xmlns:a16="http://schemas.microsoft.com/office/drawing/2014/main" id="{576C21FD-62FC-4C29-9441-CDD5A9E90DF0}"/>
+            </a:ext>
+          </a:extLst>
+        </p:cNvPr>
+        <p:cNvGrpSpPr/>
+        <p:nvPr/>
+      </p:nvGrpSpPr>
+      <p:grpSpPr>
+        <a:xfrm>
+          <a:off x="0" y="0"/>
+          <a:ext cx="0" cy="0"/>
+          <a:chOff x="0" y="0"/>
+          <a:chExt cx="0" cy="0"/>
+        </a:xfrm>
+      </p:grpSpPr>
+      <p:sp>
+        <p:nvSpPr>
+          <p:cNvPr id="2" name="Title 1">
+            <a:extLst>
+              <a:ext uri="{FF2B5EF4-FFF2-40B4-BE49-F238E27FC236}">
+                <a16:creationId xmlns:a16="http://schemas.microsoft.com/office/drawing/2014/main" id="{1680F050-FED2-A0F9-3EB6-0D080EE4A1AA}"/>
+              </a:ext>
+            </a:extLst>
+          </p:cNvPr>
+          <p:cNvSpPr>
+            <a:spLocks noGrp="1"/>
+          </p:cNvSpPr>
+          <p:nvPr>
+            <p:ph type="title"/>
+          </p:nvPr>
+        </p:nvSpPr>
+        <p:spPr>
+          <a:xfrm>
+            <a:off x="685800" y="107838"/>
+            <a:ext cx="10131425" cy="1456267"/>
+          </a:xfrm>
+        </p:spPr>
+        <p:txBody>
+          <a:bodyPr/>
+          <a:lstStyle/>
+          <a:p>
+            <a:r>
+              <a:rPr lang="en-FR" dirty="0"/>
+              <a:t>WEEK 2 – Sprint 0 – Analyse du problème	 </a:t>
+            </a:r>
+          </a:p>
+        </p:txBody>
+      </p:sp>
+      <p:sp>
+        <p:nvSpPr>
+          <p:cNvPr id="3" name="Content Placeholder 2">
+            <a:extLst>
+              <a:ext uri="{FF2B5EF4-FFF2-40B4-BE49-F238E27FC236}">
+                <a16:creationId xmlns:a16="http://schemas.microsoft.com/office/drawing/2014/main" id="{B1DE996A-5076-DF7A-6BC2-461652E1A567}"/>
+              </a:ext>
+            </a:extLst>
+          </p:cNvPr>
+          <p:cNvSpPr>
+            <a:spLocks noGrp="1"/>
+          </p:cNvSpPr>
+          <p:nvPr>
+            <p:ph idx="1"/>
+          </p:nvPr>
+        </p:nvSpPr>
+        <p:spPr>
+          <a:xfrm>
+            <a:off x="685801" y="1203159"/>
+            <a:ext cx="10131425" cy="5414210"/>
+          </a:xfrm>
+        </p:spPr>
+        <p:txBody>
+          <a:bodyPr>
+            <a:normAutofit lnSpcReduction="10000"/>
+          </a:bodyPr>
+          <a:lstStyle/>
+          <a:p>
+            <a:pPr marL="0" indent="0">
+              <a:buNone/>
+            </a:pPr>
+            <a:r>
+              <a:rPr lang="en-GB" b="1" dirty="0"/>
+              <a:t>Objectif </a:t>
+            </a:r>
+          </a:p>
+          <a:p>
+            <a:pPr marL="0" indent="0">
+              <a:buNone/>
+            </a:pPr>
+            <a:r>
+              <a:rPr lang="en-GB" dirty="0" err="1"/>
+              <a:t>Permettre</a:t>
+            </a:r>
+            <a:r>
+              <a:rPr lang="en-GB" dirty="0"/>
+              <a:t> à des </a:t>
+            </a:r>
+            <a:r>
+              <a:rPr lang="en-GB" dirty="0" err="1"/>
+              <a:t>sportifs</a:t>
+            </a:r>
+            <a:r>
+              <a:rPr lang="en-GB" dirty="0"/>
+              <a:t> de </a:t>
+            </a:r>
+            <a:r>
+              <a:rPr lang="en-GB" dirty="0" err="1"/>
+              <a:t>pouvoir</a:t>
+            </a:r>
+            <a:r>
+              <a:rPr lang="en-GB" dirty="0"/>
+              <a:t> </a:t>
+            </a:r>
+            <a:r>
+              <a:rPr lang="en-GB" dirty="0" err="1"/>
+              <a:t>suivre</a:t>
+            </a:r>
+            <a:r>
+              <a:rPr lang="en-GB" dirty="0"/>
+              <a:t> </a:t>
+            </a:r>
+            <a:r>
+              <a:rPr lang="en-GB" dirty="0" err="1"/>
+              <a:t>l’entièreté</a:t>
+            </a:r>
+            <a:r>
+              <a:rPr lang="en-GB" dirty="0"/>
+              <a:t> de </a:t>
+            </a:r>
+            <a:r>
+              <a:rPr lang="en-GB" dirty="0" err="1"/>
+              <a:t>leur</a:t>
+            </a:r>
+            <a:r>
+              <a:rPr lang="en-GB" dirty="0"/>
+              <a:t> programme/</a:t>
+            </a:r>
+            <a:r>
+              <a:rPr lang="en-GB" dirty="0" err="1"/>
+              <a:t>objectif</a:t>
+            </a:r>
+            <a:r>
+              <a:rPr lang="en-GB" dirty="0"/>
+              <a:t> physique sur </a:t>
+            </a:r>
+            <a:r>
+              <a:rPr lang="en-GB" dirty="0" err="1"/>
+              <a:t>une</a:t>
+            </a:r>
+            <a:r>
+              <a:rPr lang="en-GB" dirty="0"/>
+              <a:t> </a:t>
+            </a:r>
+            <a:r>
+              <a:rPr lang="en-GB" dirty="0" err="1"/>
+              <a:t>seule</a:t>
+            </a:r>
+            <a:r>
+              <a:rPr lang="en-GB" dirty="0"/>
+              <a:t> </a:t>
+            </a:r>
+            <a:r>
+              <a:rPr lang="en-GB" dirty="0" err="1"/>
+              <a:t>plateforme</a:t>
+            </a:r>
+            <a:r>
+              <a:rPr lang="en-GB" dirty="0"/>
+              <a:t> web, de </a:t>
+            </a:r>
+            <a:r>
+              <a:rPr lang="en-GB" dirty="0" err="1"/>
+              <a:t>planifier</a:t>
+            </a:r>
+            <a:r>
+              <a:rPr lang="en-GB" dirty="0"/>
+              <a:t> </a:t>
+            </a:r>
+            <a:r>
+              <a:rPr lang="en-GB" dirty="0" err="1"/>
+              <a:t>leur</a:t>
+            </a:r>
+            <a:r>
+              <a:rPr lang="en-GB" dirty="0"/>
+              <a:t> workouts à </a:t>
+            </a:r>
+            <a:r>
+              <a:rPr lang="en-GB" dirty="0" err="1"/>
+              <a:t>compter</a:t>
+            </a:r>
+            <a:r>
+              <a:rPr lang="en-GB" dirty="0"/>
+              <a:t> </a:t>
+            </a:r>
+            <a:r>
+              <a:rPr lang="en-GB" dirty="0" err="1"/>
+              <a:t>leurs</a:t>
+            </a:r>
+            <a:r>
+              <a:rPr lang="en-GB" dirty="0"/>
+              <a:t> calories </a:t>
+            </a:r>
+            <a:r>
+              <a:rPr lang="en-GB" dirty="0" err="1"/>
+              <a:t>en</a:t>
+            </a:r>
+            <a:r>
+              <a:rPr lang="en-GB" dirty="0"/>
+              <a:t> </a:t>
+            </a:r>
+            <a:r>
+              <a:rPr lang="en-GB" dirty="0" err="1"/>
+              <a:t>fonction</a:t>
+            </a:r>
+            <a:r>
+              <a:rPr lang="en-GB" dirty="0"/>
+              <a:t> de </a:t>
+            </a:r>
+            <a:r>
+              <a:rPr lang="en-GB" dirty="0" err="1"/>
+              <a:t>leurs</a:t>
+            </a:r>
+            <a:r>
+              <a:rPr lang="en-GB" dirty="0"/>
+              <a:t> </a:t>
+            </a:r>
+            <a:r>
+              <a:rPr lang="en-GB" dirty="0" err="1"/>
+              <a:t>repas</a:t>
+            </a:r>
+            <a:r>
+              <a:rPr lang="en-GB" dirty="0"/>
+              <a:t>. </a:t>
+            </a:r>
+          </a:p>
+          <a:p>
+            <a:pPr marL="0" indent="0">
+              <a:buNone/>
+            </a:pPr>
+            <a:r>
+              <a:rPr lang="en-GB" b="1" dirty="0"/>
+              <a:t>Le MVP (Minimum Viable Product) aura :</a:t>
+            </a:r>
+          </a:p>
+          <a:p>
+            <a:pPr>
+              <a:buFontTx/>
+              <a:buChar char="-"/>
+            </a:pPr>
+            <a:r>
+              <a:rPr lang="en-GB" dirty="0"/>
+              <a:t>Une page de login / </a:t>
+            </a:r>
+            <a:r>
+              <a:rPr lang="en-GB" dirty="0" err="1"/>
+              <a:t>création</a:t>
+            </a:r>
+            <a:r>
+              <a:rPr lang="en-GB" dirty="0"/>
+              <a:t> de </a:t>
+            </a:r>
+            <a:r>
+              <a:rPr lang="en-GB" dirty="0" err="1"/>
+              <a:t>compte</a:t>
+            </a:r>
+            <a:r>
+              <a:rPr lang="en-GB" dirty="0"/>
+              <a:t> </a:t>
+            </a:r>
+            <a:r>
+              <a:rPr lang="en-GB" dirty="0" err="1"/>
+              <a:t>permettant</a:t>
+            </a:r>
+            <a:r>
+              <a:rPr lang="en-GB" dirty="0"/>
+              <a:t> à des </a:t>
+            </a:r>
+            <a:r>
+              <a:rPr lang="en-GB" dirty="0" err="1"/>
+              <a:t>utilisateurs</a:t>
+            </a:r>
+            <a:r>
+              <a:rPr lang="en-GB" dirty="0"/>
+              <a:t> de se connecter / </a:t>
+            </a:r>
+            <a:r>
+              <a:rPr lang="en-GB" dirty="0" err="1"/>
+              <a:t>créer</a:t>
+            </a:r>
+            <a:r>
+              <a:rPr lang="en-GB" dirty="0"/>
+              <a:t> </a:t>
+            </a:r>
+            <a:r>
+              <a:rPr lang="en-GB" dirty="0" err="1"/>
+              <a:t>leur</a:t>
+            </a:r>
+            <a:r>
+              <a:rPr lang="en-GB" dirty="0"/>
+              <a:t> </a:t>
+            </a:r>
+            <a:r>
+              <a:rPr lang="en-GB" dirty="0" err="1"/>
+              <a:t>compte</a:t>
+            </a:r>
+            <a:r>
+              <a:rPr lang="en-GB" dirty="0"/>
+              <a:t> </a:t>
+            </a:r>
+          </a:p>
+          <a:p>
+            <a:pPr>
+              <a:buFontTx/>
+              <a:buChar char="-"/>
+            </a:pPr>
+            <a:r>
+              <a:rPr lang="en-GB" dirty="0"/>
+              <a:t>Une page de gestion de </a:t>
+            </a:r>
+            <a:r>
+              <a:rPr lang="en-GB" dirty="0" err="1"/>
+              <a:t>compte</a:t>
+            </a:r>
+            <a:r>
+              <a:rPr lang="en-GB" dirty="0"/>
+              <a:t> </a:t>
+            </a:r>
+            <a:r>
+              <a:rPr lang="en-GB" dirty="0" err="1"/>
+              <a:t>permettant</a:t>
+            </a:r>
+            <a:r>
+              <a:rPr lang="en-GB" dirty="0"/>
+              <a:t> à </a:t>
+            </a:r>
+            <a:r>
+              <a:rPr lang="en-GB" dirty="0" err="1"/>
+              <a:t>l’utilisateur</a:t>
+            </a:r>
+            <a:r>
+              <a:rPr lang="en-GB" dirty="0"/>
+              <a:t> de voir son </a:t>
+            </a:r>
+            <a:r>
+              <a:rPr lang="en-GB" dirty="0" err="1"/>
+              <a:t>profil</a:t>
+            </a:r>
+            <a:r>
+              <a:rPr lang="en-GB" dirty="0"/>
+              <a:t>, modifier son </a:t>
+            </a:r>
+            <a:r>
+              <a:rPr lang="en-GB" dirty="0" err="1"/>
+              <a:t>mdp</a:t>
+            </a:r>
+            <a:r>
+              <a:rPr lang="en-GB" dirty="0"/>
+              <a:t>, taille/</a:t>
+            </a:r>
+            <a:r>
+              <a:rPr lang="en-GB" dirty="0" err="1"/>
+              <a:t>poids</a:t>
+            </a:r>
+            <a:r>
+              <a:rPr lang="en-GB" dirty="0"/>
+              <a:t>, etc. </a:t>
+            </a:r>
+          </a:p>
+          <a:p>
+            <a:pPr>
+              <a:buFontTx/>
+              <a:buChar char="-"/>
+            </a:pPr>
+            <a:r>
+              <a:rPr lang="en-GB" dirty="0"/>
+              <a:t>Une page Tableau de bord </a:t>
+            </a:r>
+            <a:r>
+              <a:rPr lang="en-GB" dirty="0" err="1"/>
+              <a:t>montrant</a:t>
+            </a:r>
+            <a:r>
+              <a:rPr lang="en-GB" dirty="0"/>
+              <a:t> les </a:t>
+            </a:r>
+            <a:r>
+              <a:rPr lang="en-GB" dirty="0" err="1"/>
+              <a:t>progrès</a:t>
+            </a:r>
+            <a:r>
+              <a:rPr lang="en-GB" dirty="0"/>
+              <a:t> (calories, PR, Volume) /</a:t>
+            </a:r>
+            <a:r>
+              <a:rPr lang="en-GB" dirty="0" err="1"/>
+              <a:t>résultats</a:t>
+            </a:r>
+            <a:r>
+              <a:rPr lang="en-GB" dirty="0"/>
+              <a:t> de </a:t>
+            </a:r>
+            <a:r>
+              <a:rPr lang="en-GB" dirty="0" err="1"/>
+              <a:t>l’utilisateur</a:t>
+            </a:r>
+            <a:r>
+              <a:rPr lang="en-GB" dirty="0"/>
+              <a:t> (vide au début)</a:t>
+            </a:r>
+          </a:p>
+          <a:p>
+            <a:pPr>
+              <a:buFontTx/>
+              <a:buChar char="-"/>
+            </a:pPr>
+            <a:r>
+              <a:rPr lang="en-GB" dirty="0"/>
+              <a:t>Une page </a:t>
+            </a:r>
+            <a:r>
+              <a:rPr lang="en-GB" dirty="0" err="1"/>
+              <a:t>permettant</a:t>
+            </a:r>
+            <a:r>
+              <a:rPr lang="en-GB" dirty="0"/>
+              <a:t> </a:t>
+            </a:r>
+            <a:r>
+              <a:rPr lang="en-GB" dirty="0" err="1"/>
+              <a:t>d’avoir</a:t>
+            </a:r>
+            <a:r>
+              <a:rPr lang="en-GB" dirty="0"/>
+              <a:t> </a:t>
+            </a:r>
+            <a:r>
+              <a:rPr lang="en-GB" dirty="0" err="1"/>
+              <a:t>accès</a:t>
+            </a:r>
+            <a:r>
+              <a:rPr lang="en-GB" dirty="0"/>
+              <a:t> aux </a:t>
+            </a:r>
+            <a:r>
+              <a:rPr lang="en-GB" dirty="0" err="1"/>
+              <a:t>différentes</a:t>
+            </a:r>
+            <a:r>
+              <a:rPr lang="en-GB" dirty="0"/>
+              <a:t> </a:t>
+            </a:r>
+            <a:r>
+              <a:rPr lang="en-GB" dirty="0" err="1"/>
+              <a:t>fonctionnalités</a:t>
+            </a:r>
+            <a:r>
+              <a:rPr lang="en-GB" dirty="0"/>
+              <a:t> (</a:t>
+            </a:r>
+          </a:p>
+          <a:p>
+            <a:pPr>
+              <a:buFontTx/>
+              <a:buChar char="-"/>
+            </a:pPr>
+            <a:r>
+              <a:rPr lang="en-GB" dirty="0" err="1"/>
+              <a:t>Fonctionnalité</a:t>
+            </a:r>
+            <a:r>
+              <a:rPr lang="en-GB" dirty="0"/>
+              <a:t> Workout) : </a:t>
+            </a:r>
+            <a:r>
+              <a:rPr lang="en-GB" dirty="0" err="1"/>
+              <a:t>permettra</a:t>
+            </a:r>
+            <a:r>
+              <a:rPr lang="en-GB" dirty="0"/>
+              <a:t> de </a:t>
+            </a:r>
+            <a:r>
+              <a:rPr lang="en-GB" dirty="0" err="1"/>
+              <a:t>créer</a:t>
+            </a:r>
+            <a:r>
+              <a:rPr lang="en-GB" dirty="0"/>
+              <a:t>/</a:t>
+            </a:r>
+            <a:r>
+              <a:rPr lang="en-GB" dirty="0" err="1"/>
+              <a:t>sauvegarder</a:t>
+            </a:r>
+            <a:r>
+              <a:rPr lang="en-GB" dirty="0"/>
+              <a:t> des workouts, à </a:t>
+            </a:r>
+            <a:r>
+              <a:rPr lang="en-GB" dirty="0" err="1"/>
+              <a:t>partir</a:t>
+            </a:r>
+            <a:r>
+              <a:rPr lang="en-GB" dirty="0"/>
+              <a:t> </a:t>
+            </a:r>
+            <a:r>
+              <a:rPr lang="en-GB" dirty="0" err="1"/>
+              <a:t>d’une</a:t>
+            </a:r>
+            <a:r>
+              <a:rPr lang="en-GB" dirty="0"/>
+              <a:t> large </a:t>
+            </a:r>
+            <a:r>
+              <a:rPr lang="en-GB" dirty="0" err="1"/>
+              <a:t>gamme</a:t>
+            </a:r>
+            <a:r>
+              <a:rPr lang="en-GB" dirty="0"/>
+              <a:t> </a:t>
+            </a:r>
+            <a:r>
+              <a:rPr lang="en-GB" dirty="0" err="1"/>
+              <a:t>d’exercices</a:t>
+            </a:r>
+            <a:r>
+              <a:rPr lang="en-GB" dirty="0"/>
+              <a:t> </a:t>
+            </a:r>
+            <a:r>
+              <a:rPr lang="en-GB" dirty="0" err="1"/>
+              <a:t>disponibles</a:t>
+            </a:r>
+            <a:r>
+              <a:rPr lang="en-GB" dirty="0"/>
+              <a:t> dans des salles de musculation / divers sports (sport </a:t>
+            </a:r>
+            <a:r>
+              <a:rPr lang="en-GB" dirty="0" err="1"/>
+              <a:t>collectif</a:t>
+            </a:r>
+            <a:r>
+              <a:rPr lang="en-GB" dirty="0"/>
+              <a:t>, etc.) , </a:t>
+            </a:r>
+            <a:r>
+              <a:rPr lang="en-GB" dirty="0" err="1"/>
+              <a:t>activités</a:t>
+            </a:r>
+            <a:r>
+              <a:rPr lang="en-GB" dirty="0"/>
+              <a:t> </a:t>
+            </a:r>
+            <a:r>
+              <a:rPr lang="en-GB" dirty="0" err="1"/>
+              <a:t>sportives</a:t>
+            </a:r>
+            <a:r>
+              <a:rPr lang="en-GB" dirty="0"/>
+              <a:t> (running, etc.) </a:t>
+            </a:r>
+          </a:p>
+          <a:p>
+            <a:pPr>
+              <a:buFontTx/>
+              <a:buChar char="-"/>
+            </a:pPr>
+            <a:r>
+              <a:rPr lang="en-GB" dirty="0"/>
+              <a:t>(</a:t>
+            </a:r>
+            <a:r>
+              <a:rPr lang="en-GB" dirty="0" err="1"/>
+              <a:t>Fonctionnalité</a:t>
+            </a:r>
+            <a:r>
+              <a:rPr lang="en-GB" dirty="0"/>
+              <a:t> Food Tracker/Calorie Counter) : </a:t>
+            </a:r>
+            <a:r>
+              <a:rPr lang="en-GB" dirty="0" err="1"/>
+              <a:t>Pouvoir</a:t>
+            </a:r>
+            <a:r>
+              <a:rPr lang="en-GB" dirty="0"/>
+              <a:t> </a:t>
+            </a:r>
+            <a:r>
+              <a:rPr lang="en-GB" dirty="0" err="1"/>
+              <a:t>ajouter</a:t>
+            </a:r>
+            <a:r>
+              <a:rPr lang="en-GB" dirty="0"/>
+              <a:t> </a:t>
+            </a:r>
+            <a:r>
+              <a:rPr lang="en-GB" dirty="0" err="1"/>
+              <a:t>manuellement</a:t>
+            </a:r>
+            <a:r>
+              <a:rPr lang="en-GB" dirty="0"/>
+              <a:t> / </a:t>
+            </a:r>
+            <a:r>
+              <a:rPr lang="en-GB" dirty="0" err="1"/>
+              <a:t>sauvegarder</a:t>
+            </a:r>
+            <a:r>
+              <a:rPr lang="en-GB" dirty="0"/>
+              <a:t> divers </a:t>
+            </a:r>
+            <a:r>
+              <a:rPr lang="en-GB" dirty="0" err="1"/>
+              <a:t>repas</a:t>
+            </a:r>
+            <a:r>
+              <a:rPr lang="en-GB" dirty="0"/>
+              <a:t> / plats, et </a:t>
+            </a:r>
+            <a:r>
+              <a:rPr lang="en-GB" dirty="0" err="1"/>
+              <a:t>afficher</a:t>
+            </a:r>
+            <a:r>
+              <a:rPr lang="en-GB" dirty="0"/>
+              <a:t> aliments simples (</a:t>
+            </a:r>
+            <a:r>
+              <a:rPr lang="en-GB" dirty="0" err="1"/>
+              <a:t>protéines</a:t>
+            </a:r>
+            <a:r>
+              <a:rPr lang="en-GB" dirty="0"/>
+              <a:t>/glucides/lipides/kcal). </a:t>
+            </a:r>
+          </a:p>
+        </p:txBody>
+      </p:sp>
+    </p:spTree>
+    <p:extLst>
+      <p:ext uri="{BB962C8B-B14F-4D97-AF65-F5344CB8AC3E}">
+        <p14:creationId xmlns:p14="http://schemas.microsoft.com/office/powerpoint/2010/main" val="1685335110"/>
+      </p:ext>
+    </p:extLst>
+  </p:cSld>
+  <p:clrMapOvr>
+    <a:masterClrMapping/>
+  </p:clrMapOvr>
+</p:sld>
+</file>
+
+<file path=ppt/slides/slide14.xml><?xml version="1.0" encoding="utf-8"?>
+<p:sld xmlns:a="http://schemas.openxmlformats.org/drawingml/2006/main" xmlns:r="http://schemas.openxmlformats.org/officeDocument/2006/relationships" xmlns:p="http://schemas.openxmlformats.org/presentationml/2006/main">
+  <p:cSld>
+    <p:spTree>
+      <p:nvGrpSpPr>
+        <p:cNvPr id="1" name="">
+          <a:extLst>
+            <a:ext uri="{FF2B5EF4-FFF2-40B4-BE49-F238E27FC236}">
+              <a16:creationId xmlns:a16="http://schemas.microsoft.com/office/drawing/2014/main" id="{3DA7F8A6-2E56-2677-F014-5C2363F2470B}"/>
+            </a:ext>
+          </a:extLst>
+        </p:cNvPr>
+        <p:cNvGrpSpPr/>
+        <p:nvPr/>
+      </p:nvGrpSpPr>
+      <p:grpSpPr>
+        <a:xfrm>
+          <a:off x="0" y="0"/>
+          <a:ext cx="0" cy="0"/>
+          <a:chOff x="0" y="0"/>
+          <a:chExt cx="0" cy="0"/>
+        </a:xfrm>
+      </p:grpSpPr>
+      <p:sp>
+        <p:nvSpPr>
+          <p:cNvPr id="2" name="Title 1">
+            <a:extLst>
+              <a:ext uri="{FF2B5EF4-FFF2-40B4-BE49-F238E27FC236}">
+                <a16:creationId xmlns:a16="http://schemas.microsoft.com/office/drawing/2014/main" id="{3F0FD24A-FB57-98E4-0218-E4D843C77EE1}"/>
+              </a:ext>
+            </a:extLst>
+          </p:cNvPr>
+          <p:cNvSpPr>
+            <a:spLocks noGrp="1"/>
+          </p:cNvSpPr>
+          <p:nvPr>
+            <p:ph type="title"/>
+          </p:nvPr>
+        </p:nvSpPr>
+        <p:spPr>
+          <a:xfrm>
+            <a:off x="244641" y="119870"/>
+            <a:ext cx="11947359" cy="1456267"/>
+          </a:xfrm>
+        </p:spPr>
+        <p:txBody>
+          <a:bodyPr/>
+          <a:lstStyle/>
+          <a:p>
+            <a:r>
+              <a:rPr lang="en-FR" dirty="0"/>
+              <a:t>WEEK 2 – Sprint 0 – </a:t>
+            </a:r>
+            <a:r>
+              <a:rPr lang="en-GB" b="1" dirty="0" err="1"/>
+              <a:t>Réflexion</a:t>
+            </a:r>
+            <a:r>
+              <a:rPr lang="en-GB" b="1" dirty="0"/>
+              <a:t> </a:t>
+            </a:r>
+            <a:r>
+              <a:rPr lang="en-GB" b="1" dirty="0" err="1"/>
+              <a:t>autour</a:t>
+            </a:r>
+            <a:r>
+              <a:rPr lang="en-GB" b="1" dirty="0"/>
+              <a:t> de la conception</a:t>
+            </a:r>
+            <a:endParaRPr lang="en-GB" dirty="0"/>
+          </a:p>
+        </p:txBody>
+      </p:sp>
+      <p:sp>
+        <p:nvSpPr>
+          <p:cNvPr id="3" name="Content Placeholder 2">
+            <a:extLst>
+              <a:ext uri="{FF2B5EF4-FFF2-40B4-BE49-F238E27FC236}">
+                <a16:creationId xmlns:a16="http://schemas.microsoft.com/office/drawing/2014/main" id="{B43FB280-0732-661A-8804-F46B1955491E}"/>
+              </a:ext>
+            </a:extLst>
+          </p:cNvPr>
+          <p:cNvSpPr>
+            <a:spLocks noGrp="1"/>
+          </p:cNvSpPr>
+          <p:nvPr>
+            <p:ph idx="1"/>
+          </p:nvPr>
+        </p:nvSpPr>
+        <p:spPr>
+          <a:xfrm>
+            <a:off x="685801" y="1215189"/>
+            <a:ext cx="11032957" cy="5402180"/>
+          </a:xfrm>
+        </p:spPr>
+        <p:txBody>
+          <a:bodyPr>
+            <a:normAutofit/>
+          </a:bodyPr>
+          <a:lstStyle/>
+          <a:p>
+            <a:pPr marL="0" indent="0">
+              <a:buNone/>
+            </a:pPr>
+            <a:r>
+              <a:rPr lang="en-GB" b="1" dirty="0" err="1"/>
+              <a:t>Langage</a:t>
+            </a:r>
+            <a:r>
+              <a:rPr lang="en-GB" b="1" dirty="0"/>
+              <a:t> </a:t>
+            </a:r>
+            <a:r>
+              <a:rPr lang="en-GB" b="1" dirty="0" err="1"/>
+              <a:t>commun</a:t>
+            </a:r>
+            <a:r>
+              <a:rPr lang="en-GB" b="1" dirty="0"/>
+              <a:t> (Ubiquitous Language) </a:t>
+            </a:r>
+          </a:p>
+          <a:p>
+            <a:pPr>
+              <a:buFontTx/>
+              <a:buChar char="-"/>
+            </a:pPr>
+            <a:r>
+              <a:rPr lang="en-GB" dirty="0" err="1"/>
+              <a:t>Exercice</a:t>
+            </a:r>
+            <a:r>
+              <a:rPr lang="en-GB" dirty="0"/>
+              <a:t> : </a:t>
+            </a:r>
+            <a:r>
+              <a:rPr lang="en-GB" dirty="0" err="1"/>
+              <a:t>mouvement</a:t>
+            </a:r>
+            <a:r>
+              <a:rPr lang="en-GB" dirty="0"/>
+              <a:t> unique (ex. “Bench Press”), avec </a:t>
+            </a:r>
+            <a:r>
+              <a:rPr lang="en-GB" dirty="0" err="1"/>
+              <a:t>muscle_group</a:t>
+            </a:r>
+            <a:r>
+              <a:rPr lang="en-GB" dirty="0"/>
+              <a:t>, equipment, difficulty, tags Template (</a:t>
+            </a:r>
+            <a:r>
+              <a:rPr lang="en-GB" dirty="0" err="1"/>
+              <a:t>WorkoutTemplate</a:t>
+            </a:r>
+            <a:r>
+              <a:rPr lang="en-GB" dirty="0"/>
+              <a:t>) : plan </a:t>
+            </a:r>
+            <a:r>
+              <a:rPr lang="en-GB" dirty="0" err="1"/>
+              <a:t>réutilisable</a:t>
+            </a:r>
+            <a:r>
+              <a:rPr lang="en-GB" dirty="0"/>
+              <a:t> </a:t>
+            </a:r>
+            <a:r>
+              <a:rPr lang="en-GB" dirty="0" err="1"/>
+              <a:t>d’une</a:t>
+            </a:r>
+            <a:r>
+              <a:rPr lang="en-GB" dirty="0"/>
+              <a:t> séance (</a:t>
+            </a:r>
+            <a:r>
+              <a:rPr lang="en-GB" dirty="0" err="1"/>
+              <a:t>liste</a:t>
+            </a:r>
+            <a:r>
+              <a:rPr lang="en-GB" dirty="0"/>
+              <a:t> </a:t>
+            </a:r>
+            <a:r>
+              <a:rPr lang="en-GB" dirty="0" err="1"/>
+              <a:t>d’items</a:t>
+            </a:r>
+            <a:r>
+              <a:rPr lang="en-GB" dirty="0"/>
+              <a:t> : </a:t>
+            </a:r>
+            <a:r>
+              <a:rPr lang="en-GB" dirty="0" err="1"/>
+              <a:t>exercice</a:t>
+            </a:r>
+            <a:r>
+              <a:rPr lang="en-GB" dirty="0"/>
+              <a:t> + sets/reps/repos). </a:t>
+            </a:r>
+          </a:p>
+          <a:p>
+            <a:pPr>
+              <a:buFontTx/>
+              <a:buChar char="-"/>
+            </a:pPr>
+            <a:r>
+              <a:rPr lang="en-GB" dirty="0"/>
+              <a:t>Séance (</a:t>
+            </a:r>
+            <a:r>
+              <a:rPr lang="en-GB" dirty="0" err="1"/>
+              <a:t>WorkoutSession</a:t>
+            </a:r>
+            <a:r>
+              <a:rPr lang="en-GB" dirty="0"/>
+              <a:t>) : séance </a:t>
+            </a:r>
+            <a:r>
+              <a:rPr lang="en-GB" dirty="0" err="1"/>
+              <a:t>réalisée</a:t>
+            </a:r>
+            <a:r>
+              <a:rPr lang="en-GB" dirty="0"/>
+              <a:t> à </a:t>
+            </a:r>
+            <a:r>
+              <a:rPr lang="en-GB" dirty="0" err="1"/>
+              <a:t>une</a:t>
+            </a:r>
+            <a:r>
+              <a:rPr lang="en-GB" dirty="0"/>
+              <a:t> date donnée. </a:t>
+            </a:r>
+          </a:p>
+          <a:p>
+            <a:pPr>
+              <a:buFontTx/>
+              <a:buChar char="-"/>
+            </a:pPr>
+            <a:r>
+              <a:rPr lang="en-GB" dirty="0"/>
+              <a:t>Série (</a:t>
+            </a:r>
+            <a:r>
+              <a:rPr lang="en-GB" dirty="0" err="1"/>
+              <a:t>SetLog</a:t>
+            </a:r>
+            <a:r>
+              <a:rPr lang="en-GB" dirty="0"/>
+              <a:t>) : </a:t>
+            </a:r>
+            <a:r>
+              <a:rPr lang="en-GB" dirty="0" err="1"/>
+              <a:t>enregistrement</a:t>
+            </a:r>
+            <a:r>
+              <a:rPr lang="en-GB" dirty="0"/>
+              <a:t> </a:t>
+            </a:r>
+            <a:r>
+              <a:rPr lang="en-GB" dirty="0" err="1"/>
+              <a:t>d’une</a:t>
+            </a:r>
+            <a:r>
+              <a:rPr lang="en-GB" dirty="0"/>
+              <a:t> </a:t>
+            </a:r>
+            <a:r>
+              <a:rPr lang="en-GB" dirty="0" err="1"/>
+              <a:t>série</a:t>
+            </a:r>
+            <a:r>
+              <a:rPr lang="en-GB" dirty="0"/>
+              <a:t> (reps, </a:t>
+            </a:r>
+            <a:r>
+              <a:rPr lang="en-GB" dirty="0" err="1"/>
+              <a:t>poids</a:t>
+            </a:r>
+            <a:r>
+              <a:rPr lang="en-GB" dirty="0"/>
+              <a:t>, RPE). </a:t>
+            </a:r>
+          </a:p>
+          <a:p>
+            <a:pPr>
+              <a:buFontTx/>
+              <a:buChar char="-"/>
+            </a:pPr>
+            <a:r>
+              <a:rPr lang="en-GB" dirty="0"/>
+              <a:t>Volume : </a:t>
+            </a:r>
+            <a:r>
+              <a:rPr lang="en-GB" dirty="0" err="1"/>
+              <a:t>somme</a:t>
+            </a:r>
+            <a:r>
+              <a:rPr lang="en-GB" dirty="0"/>
+              <a:t> (</a:t>
+            </a:r>
+            <a:r>
+              <a:rPr lang="en-GB" dirty="0" err="1"/>
+              <a:t>poids</a:t>
+            </a:r>
+            <a:r>
+              <a:rPr lang="en-GB" dirty="0"/>
+              <a:t> × reps) sur </a:t>
+            </a:r>
+            <a:r>
+              <a:rPr lang="en-GB" dirty="0" err="1"/>
+              <a:t>une</a:t>
+            </a:r>
+            <a:r>
+              <a:rPr lang="en-GB" dirty="0"/>
+              <a:t> </a:t>
+            </a:r>
+            <a:r>
+              <a:rPr lang="en-GB" dirty="0" err="1"/>
+              <a:t>période</a:t>
+            </a:r>
+            <a:r>
+              <a:rPr lang="en-GB" dirty="0"/>
+              <a:t>. </a:t>
+            </a:r>
+          </a:p>
+          <a:p>
+            <a:pPr>
+              <a:buFontTx/>
+              <a:buChar char="-"/>
+            </a:pPr>
+            <a:r>
+              <a:rPr lang="en-GB" dirty="0"/>
+              <a:t>PR : </a:t>
+            </a:r>
+            <a:r>
+              <a:rPr lang="en-GB" dirty="0" err="1"/>
+              <a:t>meilleur</a:t>
+            </a:r>
+            <a:r>
+              <a:rPr lang="en-GB" dirty="0"/>
+              <a:t> score sur </a:t>
+            </a:r>
+            <a:r>
+              <a:rPr lang="en-GB" dirty="0" err="1"/>
+              <a:t>une</a:t>
+            </a:r>
+            <a:r>
+              <a:rPr lang="en-GB" dirty="0"/>
+              <a:t> </a:t>
+            </a:r>
+            <a:r>
+              <a:rPr lang="en-GB" dirty="0" err="1"/>
+              <a:t>métrique</a:t>
+            </a:r>
+            <a:r>
+              <a:rPr lang="en-GB" dirty="0"/>
+              <a:t> donnée (1RM </a:t>
+            </a:r>
+            <a:r>
+              <a:rPr lang="en-GB" dirty="0" err="1"/>
+              <a:t>estimé</a:t>
+            </a:r>
+            <a:r>
+              <a:rPr lang="en-GB" dirty="0"/>
+              <a:t>, reps max, charge max). </a:t>
+            </a:r>
+          </a:p>
+          <a:p>
+            <a:pPr>
+              <a:buFontTx/>
+              <a:buChar char="-"/>
+            </a:pPr>
+            <a:r>
+              <a:rPr lang="en-GB" dirty="0"/>
+              <a:t>Aliment (Food) : </a:t>
+            </a:r>
+            <a:r>
+              <a:rPr lang="en-GB" dirty="0" err="1"/>
+              <a:t>entité</a:t>
+            </a:r>
+            <a:r>
+              <a:rPr lang="en-GB" dirty="0"/>
+              <a:t> </a:t>
+            </a:r>
+            <a:r>
+              <a:rPr lang="en-GB" dirty="0" err="1"/>
+              <a:t>nutritionnelle</a:t>
+            </a:r>
+            <a:r>
+              <a:rPr lang="en-GB" dirty="0"/>
+              <a:t> (kcal, P/C/F pour 100 g). </a:t>
+            </a:r>
+          </a:p>
+          <a:p>
+            <a:pPr>
+              <a:buFontTx/>
+              <a:buChar char="-"/>
+            </a:pPr>
+            <a:r>
+              <a:rPr lang="en-GB" dirty="0"/>
+              <a:t>Journal </a:t>
+            </a:r>
+            <a:r>
+              <a:rPr lang="en-GB" dirty="0" err="1"/>
+              <a:t>alimentaire</a:t>
+            </a:r>
+            <a:r>
+              <a:rPr lang="en-GB" dirty="0"/>
+              <a:t> (</a:t>
+            </a:r>
+            <a:r>
+              <a:rPr lang="en-GB" dirty="0" err="1"/>
+              <a:t>FoodLog</a:t>
+            </a:r>
+            <a:r>
+              <a:rPr lang="en-GB" dirty="0"/>
+              <a:t>) : entrées </a:t>
+            </a:r>
+            <a:r>
+              <a:rPr lang="en-GB" dirty="0" err="1"/>
+              <a:t>journalières</a:t>
+            </a:r>
+            <a:r>
+              <a:rPr lang="en-GB" dirty="0"/>
+              <a:t> (aliment, grammes) et </a:t>
+            </a:r>
+            <a:r>
+              <a:rPr lang="en-GB" dirty="0" err="1"/>
+              <a:t>totaux</a:t>
+            </a:r>
+            <a:r>
+              <a:rPr lang="en-GB" dirty="0"/>
+              <a:t>.</a:t>
+            </a:r>
+          </a:p>
+          <a:p>
+            <a:pPr>
+              <a:buFontTx/>
+              <a:buChar char="-"/>
+            </a:pPr>
+            <a:r>
+              <a:rPr lang="en-GB" dirty="0"/>
+              <a:t>Objectif : but simple (ex. “prise de muscle”, “</a:t>
+            </a:r>
+            <a:r>
+              <a:rPr lang="en-GB" dirty="0" err="1"/>
+              <a:t>perte</a:t>
+            </a:r>
+            <a:r>
+              <a:rPr lang="en-GB" dirty="0"/>
+              <a:t> de </a:t>
+            </a:r>
+            <a:r>
+              <a:rPr lang="en-GB" dirty="0" err="1"/>
+              <a:t>poids</a:t>
+            </a:r>
+            <a:r>
+              <a:rPr lang="en-GB" dirty="0"/>
+              <a:t>”), influence les feedbacks.</a:t>
+            </a:r>
+          </a:p>
+        </p:txBody>
+      </p:sp>
+    </p:spTree>
+    <p:extLst>
+      <p:ext uri="{BB962C8B-B14F-4D97-AF65-F5344CB8AC3E}">
+        <p14:creationId xmlns:p14="http://schemas.microsoft.com/office/powerpoint/2010/main" val="851929529"/>
+      </p:ext>
+    </p:extLst>
+  </p:cSld>
+  <p:clrMapOvr>
+    <a:masterClrMapping/>
+  </p:clrMapOvr>
+</p:sld>
+</file>
+
+<file path=ppt/slides/slide15.xml><?xml version="1.0" encoding="utf-8"?>
+<p:sld xmlns:a="http://schemas.openxmlformats.org/drawingml/2006/main" xmlns:r="http://schemas.openxmlformats.org/officeDocument/2006/relationships" xmlns:p="http://schemas.openxmlformats.org/presentationml/2006/main">
+  <p:cSld>
+    <p:spTree>
+      <p:nvGrpSpPr>
+        <p:cNvPr id="1" name="">
+          <a:extLst>
+            <a:ext uri="{FF2B5EF4-FFF2-40B4-BE49-F238E27FC236}">
+              <a16:creationId xmlns:a16="http://schemas.microsoft.com/office/drawing/2014/main" id="{65E36BCB-B5BE-32D3-E73E-4E2D29940C13}"/>
+            </a:ext>
+          </a:extLst>
+        </p:cNvPr>
+        <p:cNvGrpSpPr/>
+        <p:nvPr/>
+      </p:nvGrpSpPr>
+      <p:grpSpPr>
+        <a:xfrm>
+          <a:off x="0" y="0"/>
+          <a:ext cx="0" cy="0"/>
+          <a:chOff x="0" y="0"/>
+          <a:chExt cx="0" cy="0"/>
+        </a:xfrm>
+      </p:grpSpPr>
+      <p:sp>
+        <p:nvSpPr>
+          <p:cNvPr id="2" name="Title 1">
+            <a:extLst>
+              <a:ext uri="{FF2B5EF4-FFF2-40B4-BE49-F238E27FC236}">
+                <a16:creationId xmlns:a16="http://schemas.microsoft.com/office/drawing/2014/main" id="{BE26FBBB-38BC-30DB-67B4-742BDEE5C52E}"/>
+              </a:ext>
+            </a:extLst>
+          </p:cNvPr>
+          <p:cNvSpPr>
+            <a:spLocks noGrp="1"/>
+          </p:cNvSpPr>
+          <p:nvPr>
+            <p:ph type="title"/>
+          </p:nvPr>
+        </p:nvSpPr>
+        <p:spPr>
+          <a:xfrm>
+            <a:off x="244641" y="119870"/>
+            <a:ext cx="11947359" cy="1456267"/>
+          </a:xfrm>
+        </p:spPr>
+        <p:txBody>
+          <a:bodyPr/>
+          <a:lstStyle/>
+          <a:p>
+            <a:r>
+              <a:rPr lang="en-FR" dirty="0"/>
+              <a:t>WEEK 2 – Sprint 0 – </a:t>
+            </a:r>
+            <a:r>
+              <a:rPr lang="en-GB" b="1" dirty="0" err="1"/>
+              <a:t>Réflexion</a:t>
+            </a:r>
+            <a:r>
+              <a:rPr lang="en-GB" b="1" dirty="0"/>
+              <a:t> </a:t>
+            </a:r>
+            <a:r>
+              <a:rPr lang="en-GB" b="1" dirty="0" err="1"/>
+              <a:t>autour</a:t>
+            </a:r>
+            <a:r>
+              <a:rPr lang="en-GB" b="1" dirty="0"/>
+              <a:t> de la conception</a:t>
+            </a:r>
+            <a:endParaRPr lang="en-GB" dirty="0"/>
+          </a:p>
+        </p:txBody>
+      </p:sp>
+      <p:sp>
+        <p:nvSpPr>
+          <p:cNvPr id="3" name="Content Placeholder 2">
+            <a:extLst>
+              <a:ext uri="{FF2B5EF4-FFF2-40B4-BE49-F238E27FC236}">
+                <a16:creationId xmlns:a16="http://schemas.microsoft.com/office/drawing/2014/main" id="{4A5384CF-6917-9CE1-A559-70DB234DB713}"/>
+              </a:ext>
+            </a:extLst>
+          </p:cNvPr>
+          <p:cNvSpPr>
+            <a:spLocks noGrp="1"/>
+          </p:cNvSpPr>
+          <p:nvPr>
+            <p:ph idx="1"/>
+          </p:nvPr>
+        </p:nvSpPr>
+        <p:spPr>
+          <a:xfrm>
+            <a:off x="161635" y="1094874"/>
+            <a:ext cx="6545179" cy="4944979"/>
+          </a:xfrm>
+        </p:spPr>
+        <p:txBody>
+          <a:bodyPr>
+            <a:normAutofit fontScale="70000" lnSpcReduction="20000"/>
+          </a:bodyPr>
+          <a:lstStyle/>
+          <a:p>
+            <a:pPr marL="0" indent="0">
+              <a:buNone/>
+            </a:pPr>
+            <a:r>
+              <a:rPr lang="en-GB" dirty="0"/>
+              <a:t>User Stories </a:t>
+            </a:r>
+          </a:p>
+          <a:p>
+            <a:pPr marL="0" indent="0">
+              <a:buNone/>
+            </a:pPr>
+            <a:r>
+              <a:rPr lang="en-GB" dirty="0"/>
+              <a:t>Navigation &amp; </a:t>
+            </a:r>
+            <a:r>
+              <a:rPr lang="en-GB" dirty="0" err="1"/>
+              <a:t>Découverte</a:t>
+            </a:r>
+            <a:endParaRPr lang="en-GB" dirty="0"/>
+          </a:p>
+          <a:p>
+            <a:pPr>
+              <a:buFontTx/>
+              <a:buChar char="-"/>
+            </a:pPr>
+            <a:r>
+              <a:rPr lang="en-GB" dirty="0"/>
+              <a:t> En tant </a:t>
+            </a:r>
+            <a:r>
+              <a:rPr lang="en-GB" dirty="0" err="1"/>
+              <a:t>que</a:t>
+            </a:r>
+            <a:r>
+              <a:rPr lang="en-GB" dirty="0"/>
+              <a:t> </a:t>
+            </a:r>
+            <a:r>
+              <a:rPr lang="en-GB" dirty="0" err="1"/>
+              <a:t>visiteur</a:t>
+            </a:r>
+            <a:r>
+              <a:rPr lang="en-GB" dirty="0"/>
+              <a:t>, je </a:t>
+            </a:r>
+            <a:r>
+              <a:rPr lang="en-GB" dirty="0" err="1"/>
+              <a:t>peux</a:t>
+            </a:r>
+            <a:r>
+              <a:rPr lang="en-GB" dirty="0"/>
+              <a:t> voir la page </a:t>
+            </a:r>
+            <a:r>
+              <a:rPr lang="en-GB" dirty="0" err="1"/>
+              <a:t>d'accueil</a:t>
+            </a:r>
+            <a:r>
+              <a:rPr lang="en-GB" dirty="0"/>
+              <a:t> avec les </a:t>
+            </a:r>
+            <a:r>
+              <a:rPr lang="en-GB" dirty="0" err="1"/>
+              <a:t>produits</a:t>
+            </a:r>
+            <a:r>
+              <a:rPr lang="en-GB" dirty="0"/>
+              <a:t> phares </a:t>
+            </a:r>
+          </a:p>
+          <a:p>
+            <a:pPr>
+              <a:buFontTx/>
+              <a:buChar char="-"/>
+            </a:pPr>
+            <a:r>
+              <a:rPr lang="en-GB" dirty="0"/>
+              <a:t> En tant </a:t>
+            </a:r>
+            <a:r>
+              <a:rPr lang="en-GB" dirty="0" err="1"/>
+              <a:t>que</a:t>
+            </a:r>
+            <a:r>
+              <a:rPr lang="en-GB" dirty="0"/>
+              <a:t> </a:t>
+            </a:r>
+            <a:r>
+              <a:rPr lang="en-GB" dirty="0" err="1"/>
+              <a:t>visiteur</a:t>
+            </a:r>
+            <a:r>
+              <a:rPr lang="en-GB" dirty="0"/>
+              <a:t>, je </a:t>
+            </a:r>
+            <a:r>
+              <a:rPr lang="en-GB" dirty="0" err="1"/>
+              <a:t>peux</a:t>
+            </a:r>
+            <a:r>
+              <a:rPr lang="en-GB" dirty="0"/>
+              <a:t> </a:t>
+            </a:r>
+            <a:r>
+              <a:rPr lang="en-GB" dirty="0" err="1"/>
+              <a:t>parcourir</a:t>
+            </a:r>
+            <a:r>
+              <a:rPr lang="en-GB" dirty="0"/>
+              <a:t> le catalogue </a:t>
+            </a:r>
+            <a:r>
+              <a:rPr lang="en-GB" dirty="0" err="1"/>
+              <a:t>complet</a:t>
+            </a:r>
+            <a:r>
+              <a:rPr lang="en-GB" dirty="0"/>
+              <a:t> des </a:t>
+            </a:r>
+            <a:r>
+              <a:rPr lang="en-GB" dirty="0" err="1"/>
+              <a:t>produits</a:t>
+            </a:r>
+            <a:r>
+              <a:rPr lang="en-GB" dirty="0"/>
+              <a:t> </a:t>
+            </a:r>
+          </a:p>
+          <a:p>
+            <a:pPr>
+              <a:buFontTx/>
+              <a:buChar char="-"/>
+            </a:pPr>
+            <a:r>
+              <a:rPr lang="en-GB" dirty="0"/>
+              <a:t> En tant </a:t>
+            </a:r>
+            <a:r>
+              <a:rPr lang="en-GB" dirty="0" err="1"/>
+              <a:t>que</a:t>
+            </a:r>
+            <a:r>
+              <a:rPr lang="en-GB" dirty="0"/>
+              <a:t> </a:t>
+            </a:r>
+            <a:r>
+              <a:rPr lang="en-GB" dirty="0" err="1"/>
+              <a:t>visiteur</a:t>
+            </a:r>
+            <a:r>
+              <a:rPr lang="en-GB" dirty="0"/>
+              <a:t>, je </a:t>
+            </a:r>
+            <a:r>
+              <a:rPr lang="en-GB" dirty="0" err="1"/>
+              <a:t>peux</a:t>
+            </a:r>
+            <a:r>
+              <a:rPr lang="en-GB" dirty="0"/>
+              <a:t> </a:t>
+            </a:r>
+            <a:r>
+              <a:rPr lang="en-GB" dirty="0" err="1"/>
+              <a:t>filtrer</a:t>
+            </a:r>
+            <a:r>
+              <a:rPr lang="en-GB" dirty="0"/>
+              <a:t> les </a:t>
+            </a:r>
+            <a:r>
+              <a:rPr lang="en-GB" dirty="0" err="1"/>
+              <a:t>produits</a:t>
+            </a:r>
+            <a:r>
+              <a:rPr lang="en-GB" dirty="0"/>
+              <a:t> par </a:t>
+            </a:r>
+            <a:r>
+              <a:rPr lang="en-GB" dirty="0" err="1"/>
+              <a:t>producteur</a:t>
+            </a:r>
+            <a:r>
+              <a:rPr lang="en-GB" dirty="0"/>
+              <a:t> </a:t>
+            </a:r>
+          </a:p>
+          <a:p>
+            <a:pPr>
+              <a:buFontTx/>
+              <a:buChar char="-"/>
+            </a:pPr>
+            <a:r>
+              <a:rPr lang="en-GB" dirty="0"/>
+              <a:t> En tant </a:t>
+            </a:r>
+            <a:r>
+              <a:rPr lang="en-GB" dirty="0" err="1"/>
+              <a:t>que</a:t>
+            </a:r>
+            <a:r>
+              <a:rPr lang="en-GB" dirty="0"/>
+              <a:t> </a:t>
+            </a:r>
+            <a:r>
+              <a:rPr lang="en-GB" dirty="0" err="1"/>
+              <a:t>visiteur</a:t>
+            </a:r>
+            <a:r>
+              <a:rPr lang="en-GB" dirty="0"/>
+              <a:t>, je </a:t>
+            </a:r>
+            <a:r>
+              <a:rPr lang="en-GB" dirty="0" err="1"/>
+              <a:t>peux</a:t>
+            </a:r>
+            <a:r>
+              <a:rPr lang="en-GB" dirty="0"/>
+              <a:t> </a:t>
+            </a:r>
+            <a:r>
+              <a:rPr lang="en-GB" dirty="0" err="1"/>
+              <a:t>rechercher</a:t>
+            </a:r>
+            <a:r>
+              <a:rPr lang="en-GB" dirty="0"/>
+              <a:t> un </a:t>
+            </a:r>
+            <a:r>
+              <a:rPr lang="en-GB" dirty="0" err="1"/>
+              <a:t>produit</a:t>
+            </a:r>
+            <a:r>
+              <a:rPr lang="en-GB" dirty="0"/>
+              <a:t> par nom </a:t>
+            </a:r>
+          </a:p>
+          <a:p>
+            <a:pPr>
+              <a:buFontTx/>
+              <a:buChar char="-"/>
+            </a:pPr>
+            <a:r>
+              <a:rPr lang="en-GB" dirty="0"/>
+              <a:t> En tant </a:t>
+            </a:r>
+            <a:r>
+              <a:rPr lang="en-GB" dirty="0" err="1"/>
+              <a:t>que</a:t>
+            </a:r>
+            <a:r>
+              <a:rPr lang="en-GB" dirty="0"/>
+              <a:t> </a:t>
+            </a:r>
+            <a:r>
+              <a:rPr lang="en-GB" dirty="0" err="1"/>
+              <a:t>visiteur</a:t>
+            </a:r>
+            <a:r>
+              <a:rPr lang="en-GB" dirty="0"/>
+              <a:t>, je </a:t>
+            </a:r>
+            <a:r>
+              <a:rPr lang="en-GB" dirty="0" err="1"/>
+              <a:t>peux</a:t>
+            </a:r>
+            <a:r>
+              <a:rPr lang="en-GB" dirty="0"/>
+              <a:t> </a:t>
+            </a:r>
+            <a:r>
+              <a:rPr lang="en-GB" dirty="0" err="1"/>
+              <a:t>rechercher</a:t>
+            </a:r>
+            <a:r>
+              <a:rPr lang="en-GB" dirty="0"/>
+              <a:t> un </a:t>
+            </a:r>
+            <a:r>
+              <a:rPr lang="en-GB" dirty="0" err="1"/>
+              <a:t>producteur</a:t>
+            </a:r>
+            <a:r>
+              <a:rPr lang="en-GB" dirty="0"/>
+              <a:t> par nom</a:t>
+            </a:r>
+          </a:p>
+          <a:p>
+            <a:pPr marL="0" indent="0">
+              <a:buNone/>
+            </a:pPr>
+            <a:r>
+              <a:rPr lang="en-GB" dirty="0" err="1"/>
+              <a:t>Produits</a:t>
+            </a:r>
+            <a:endParaRPr lang="en-GB" dirty="0"/>
+          </a:p>
+          <a:p>
+            <a:pPr>
+              <a:buFontTx/>
+              <a:buChar char="-"/>
+            </a:pPr>
+            <a:r>
+              <a:rPr lang="en-GB" dirty="0"/>
+              <a:t> En tant </a:t>
+            </a:r>
+            <a:r>
+              <a:rPr lang="en-GB" dirty="0" err="1"/>
+              <a:t>que</a:t>
+            </a:r>
+            <a:r>
+              <a:rPr lang="en-GB" dirty="0"/>
+              <a:t> </a:t>
+            </a:r>
+            <a:r>
+              <a:rPr lang="en-GB" dirty="0" err="1"/>
+              <a:t>visiteur</a:t>
+            </a:r>
+            <a:r>
+              <a:rPr lang="en-GB" dirty="0"/>
+              <a:t>, je </a:t>
+            </a:r>
+            <a:r>
+              <a:rPr lang="en-GB" dirty="0" err="1"/>
+              <a:t>peux</a:t>
+            </a:r>
+            <a:r>
+              <a:rPr lang="en-GB" dirty="0"/>
+              <a:t> voir les </a:t>
+            </a:r>
+            <a:r>
+              <a:rPr lang="en-GB" dirty="0" err="1"/>
+              <a:t>détails</a:t>
+            </a:r>
+            <a:r>
+              <a:rPr lang="en-GB" dirty="0"/>
+              <a:t> d'un </a:t>
+            </a:r>
+            <a:r>
+              <a:rPr lang="en-GB" dirty="0" err="1"/>
+              <a:t>produit</a:t>
+            </a:r>
+            <a:r>
+              <a:rPr lang="en-GB" dirty="0"/>
+              <a:t> (nom, prix, stock, </a:t>
+            </a:r>
+            <a:r>
+              <a:rPr lang="en-GB" dirty="0" err="1"/>
+              <a:t>producteur</a:t>
+            </a:r>
+            <a:r>
+              <a:rPr lang="en-GB" dirty="0"/>
+              <a:t>) </a:t>
+            </a:r>
+          </a:p>
+          <a:p>
+            <a:pPr>
+              <a:buFontTx/>
+              <a:buChar char="-"/>
+            </a:pPr>
+            <a:r>
+              <a:rPr lang="en-GB" dirty="0"/>
+              <a:t> En tant </a:t>
+            </a:r>
+            <a:r>
+              <a:rPr lang="en-GB" dirty="0" err="1"/>
+              <a:t>que</a:t>
+            </a:r>
+            <a:r>
+              <a:rPr lang="en-GB" dirty="0"/>
+              <a:t> </a:t>
+            </a:r>
+            <a:r>
+              <a:rPr lang="en-GB" dirty="0" err="1"/>
+              <a:t>visiteur</a:t>
+            </a:r>
+            <a:r>
+              <a:rPr lang="en-GB" dirty="0"/>
+              <a:t>, je </a:t>
+            </a:r>
+            <a:r>
+              <a:rPr lang="en-GB" dirty="0" err="1"/>
+              <a:t>peux</a:t>
+            </a:r>
+            <a:r>
+              <a:rPr lang="en-GB" dirty="0"/>
+              <a:t> voir </a:t>
+            </a:r>
+            <a:r>
+              <a:rPr lang="en-GB" dirty="0" err="1"/>
+              <a:t>si</a:t>
+            </a:r>
+            <a:r>
+              <a:rPr lang="en-GB" dirty="0"/>
+              <a:t> un </a:t>
+            </a:r>
+            <a:r>
+              <a:rPr lang="en-GB" dirty="0" err="1"/>
+              <a:t>produit</a:t>
+            </a:r>
+            <a:r>
+              <a:rPr lang="en-GB" dirty="0"/>
+              <a:t> est </a:t>
+            </a:r>
+            <a:r>
+              <a:rPr lang="en-GB" dirty="0" err="1"/>
+              <a:t>en</a:t>
+            </a:r>
+            <a:r>
+              <a:rPr lang="en-GB" dirty="0"/>
+              <a:t> stock </a:t>
+            </a:r>
+            <a:r>
+              <a:rPr lang="en-GB" dirty="0" err="1"/>
+              <a:t>ou</a:t>
+            </a:r>
+            <a:r>
+              <a:rPr lang="en-GB" dirty="0"/>
+              <a:t> </a:t>
+            </a:r>
+            <a:r>
+              <a:rPr lang="en-GB" dirty="0" err="1"/>
+              <a:t>en</a:t>
+            </a:r>
+            <a:r>
+              <a:rPr lang="en-GB" dirty="0"/>
+              <a:t> rupture </a:t>
+            </a:r>
+          </a:p>
+          <a:p>
+            <a:pPr>
+              <a:buFontTx/>
+              <a:buChar char="-"/>
+            </a:pPr>
+            <a:r>
+              <a:rPr lang="en-GB" dirty="0"/>
+              <a:t> En tant </a:t>
+            </a:r>
+            <a:r>
+              <a:rPr lang="en-GB" dirty="0" err="1"/>
+              <a:t>que</a:t>
+            </a:r>
+            <a:r>
+              <a:rPr lang="en-GB" dirty="0"/>
+              <a:t> </a:t>
+            </a:r>
+            <a:r>
+              <a:rPr lang="en-GB" dirty="0" err="1"/>
+              <a:t>visiteur</a:t>
+            </a:r>
+            <a:r>
+              <a:rPr lang="en-GB" dirty="0"/>
+              <a:t>, je </a:t>
+            </a:r>
+            <a:r>
+              <a:rPr lang="en-GB" dirty="0" err="1"/>
+              <a:t>peux</a:t>
+            </a:r>
+            <a:r>
+              <a:rPr lang="en-GB" dirty="0"/>
+              <a:t> voir les </a:t>
+            </a:r>
+            <a:r>
+              <a:rPr lang="en-GB" dirty="0" err="1"/>
+              <a:t>produits</a:t>
+            </a:r>
+            <a:r>
+              <a:rPr lang="en-GB" dirty="0"/>
+              <a:t> </a:t>
+            </a:r>
+            <a:r>
+              <a:rPr lang="en-GB" dirty="0" err="1"/>
+              <a:t>similaires</a:t>
+            </a:r>
+            <a:r>
+              <a:rPr lang="en-GB" dirty="0"/>
+              <a:t> du </a:t>
+            </a:r>
+            <a:r>
+              <a:rPr lang="en-GB" dirty="0" err="1"/>
+              <a:t>même</a:t>
+            </a:r>
+            <a:r>
+              <a:rPr lang="en-GB" dirty="0"/>
+              <a:t> </a:t>
+            </a:r>
+            <a:r>
+              <a:rPr lang="en-GB" dirty="0" err="1"/>
+              <a:t>producteur</a:t>
+            </a:r>
+            <a:r>
+              <a:rPr lang="en-GB" dirty="0"/>
+              <a:t> </a:t>
+            </a:r>
+          </a:p>
+          <a:p>
+            <a:pPr>
+              <a:buFontTx/>
+              <a:buChar char="-"/>
+            </a:pPr>
+            <a:r>
+              <a:rPr lang="en-GB" dirty="0"/>
+              <a:t> En tant </a:t>
+            </a:r>
+            <a:r>
+              <a:rPr lang="en-GB" dirty="0" err="1"/>
+              <a:t>que</a:t>
+            </a:r>
+            <a:r>
+              <a:rPr lang="en-GB" dirty="0"/>
+              <a:t> </a:t>
+            </a:r>
+            <a:r>
+              <a:rPr lang="en-GB" dirty="0" err="1"/>
+              <a:t>visiteur</a:t>
+            </a:r>
+            <a:r>
+              <a:rPr lang="en-GB" dirty="0"/>
+              <a:t>, je </a:t>
+            </a:r>
+            <a:r>
+              <a:rPr lang="en-GB" dirty="0" err="1"/>
+              <a:t>peux</a:t>
+            </a:r>
+            <a:r>
+              <a:rPr lang="en-GB" dirty="0"/>
+              <a:t> voir les </a:t>
+            </a:r>
+            <a:r>
+              <a:rPr lang="en-GB" dirty="0" err="1"/>
+              <a:t>produits</a:t>
+            </a:r>
+            <a:r>
+              <a:rPr lang="en-GB" dirty="0"/>
+              <a:t> par </a:t>
+            </a:r>
+            <a:r>
+              <a:rPr lang="en-GB" dirty="0" err="1"/>
+              <a:t>catégorie</a:t>
+            </a:r>
+            <a:r>
+              <a:rPr lang="en-GB" dirty="0"/>
+              <a:t> (fruits, </a:t>
+            </a:r>
+            <a:r>
+              <a:rPr lang="en-GB" dirty="0" err="1"/>
+              <a:t>légumes</a:t>
+            </a:r>
+            <a:r>
+              <a:rPr lang="en-GB" dirty="0"/>
+              <a:t>, </a:t>
+            </a:r>
+            <a:r>
+              <a:rPr lang="en-GB" dirty="0" err="1"/>
+              <a:t>laitages</a:t>
+            </a:r>
+            <a:r>
+              <a:rPr lang="en-GB" dirty="0"/>
+              <a:t>, etc.)</a:t>
+            </a:r>
+          </a:p>
+          <a:p>
+            <a:pPr marL="0" indent="0">
+              <a:buNone/>
+            </a:pPr>
+            <a:r>
+              <a:rPr lang="en-GB" dirty="0" err="1"/>
+              <a:t>Producteurs</a:t>
+            </a:r>
+            <a:endParaRPr lang="en-GB" dirty="0"/>
+          </a:p>
+          <a:p>
+            <a:pPr>
+              <a:buFontTx/>
+              <a:buChar char="-"/>
+            </a:pPr>
+            <a:r>
+              <a:rPr lang="en-GB" dirty="0"/>
+              <a:t> En tant </a:t>
+            </a:r>
+            <a:r>
+              <a:rPr lang="en-GB" dirty="0" err="1"/>
+              <a:t>que</a:t>
+            </a:r>
+            <a:r>
+              <a:rPr lang="en-GB" dirty="0"/>
+              <a:t> </a:t>
+            </a:r>
+            <a:r>
+              <a:rPr lang="en-GB" dirty="0" err="1"/>
+              <a:t>visiteur</a:t>
+            </a:r>
+            <a:r>
+              <a:rPr lang="en-GB" dirty="0"/>
+              <a:t>, je </a:t>
+            </a:r>
+            <a:r>
+              <a:rPr lang="en-GB" dirty="0" err="1"/>
+              <a:t>peux</a:t>
+            </a:r>
+            <a:r>
+              <a:rPr lang="en-GB" dirty="0"/>
+              <a:t> voir la </a:t>
+            </a:r>
+            <a:r>
+              <a:rPr lang="en-GB" dirty="0" err="1"/>
+              <a:t>liste</a:t>
+            </a:r>
+            <a:r>
+              <a:rPr lang="en-GB" dirty="0"/>
+              <a:t> de </a:t>
+            </a:r>
+            <a:r>
+              <a:rPr lang="en-GB" dirty="0" err="1"/>
+              <a:t>tous</a:t>
+            </a:r>
+            <a:r>
+              <a:rPr lang="en-GB" dirty="0"/>
+              <a:t> les </a:t>
+            </a:r>
+            <a:r>
+              <a:rPr lang="en-GB" dirty="0" err="1"/>
+              <a:t>producteurs</a:t>
+            </a:r>
+            <a:endParaRPr lang="en-GB" dirty="0"/>
+          </a:p>
+          <a:p>
+            <a:pPr>
+              <a:buFontTx/>
+              <a:buChar char="-"/>
+            </a:pPr>
+            <a:r>
+              <a:rPr lang="en-GB" dirty="0"/>
+              <a:t>En tant </a:t>
+            </a:r>
+            <a:r>
+              <a:rPr lang="en-GB" dirty="0" err="1"/>
+              <a:t>que</a:t>
+            </a:r>
+            <a:r>
+              <a:rPr lang="en-GB" dirty="0"/>
+              <a:t> </a:t>
+            </a:r>
+            <a:r>
+              <a:rPr lang="en-GB" dirty="0" err="1"/>
+              <a:t>visiteur</a:t>
+            </a:r>
+            <a:r>
+              <a:rPr lang="en-GB" dirty="0"/>
+              <a:t>, je </a:t>
+            </a:r>
+            <a:r>
+              <a:rPr lang="en-GB" dirty="0" err="1"/>
+              <a:t>peux</a:t>
+            </a:r>
+            <a:r>
+              <a:rPr lang="en-GB" dirty="0"/>
+              <a:t> voir le </a:t>
+            </a:r>
+            <a:r>
+              <a:rPr lang="en-GB" dirty="0" err="1"/>
+              <a:t>profil</a:t>
+            </a:r>
+            <a:r>
+              <a:rPr lang="en-GB" dirty="0"/>
+              <a:t> d'un </a:t>
+            </a:r>
+            <a:r>
+              <a:rPr lang="en-GB" dirty="0" err="1"/>
+              <a:t>producteur</a:t>
+            </a:r>
+            <a:r>
+              <a:rPr lang="en-GB" dirty="0"/>
+              <a:t> avec </a:t>
+            </a:r>
+            <a:r>
+              <a:rPr lang="en-GB" dirty="0" err="1"/>
+              <a:t>ses</a:t>
+            </a:r>
+            <a:r>
+              <a:rPr lang="en-GB" dirty="0"/>
+              <a:t> </a:t>
+            </a:r>
+            <a:r>
+              <a:rPr lang="en-GB" dirty="0" err="1"/>
+              <a:t>coordonnées</a:t>
+            </a:r>
+            <a:r>
+              <a:rPr lang="en-GB" dirty="0"/>
+              <a:t> –</a:t>
+            </a:r>
+          </a:p>
+          <a:p>
+            <a:pPr>
+              <a:buFontTx/>
+              <a:buChar char="-"/>
+            </a:pPr>
+            <a:r>
+              <a:rPr lang="en-GB" dirty="0"/>
+              <a:t>En tant </a:t>
+            </a:r>
+            <a:r>
+              <a:rPr lang="en-GB" dirty="0" err="1"/>
+              <a:t>que</a:t>
+            </a:r>
+            <a:r>
+              <a:rPr lang="en-GB" dirty="0"/>
+              <a:t> </a:t>
+            </a:r>
+            <a:r>
+              <a:rPr lang="en-GB" dirty="0" err="1"/>
+              <a:t>visiteur</a:t>
+            </a:r>
+            <a:r>
+              <a:rPr lang="en-GB" dirty="0"/>
+              <a:t>, je </a:t>
+            </a:r>
+            <a:r>
+              <a:rPr lang="en-GB" dirty="0" err="1"/>
+              <a:t>peux</a:t>
+            </a:r>
+            <a:r>
+              <a:rPr lang="en-GB" dirty="0"/>
+              <a:t> voir </a:t>
+            </a:r>
+            <a:r>
+              <a:rPr lang="en-GB" dirty="0" err="1"/>
+              <a:t>tous</a:t>
+            </a:r>
+            <a:r>
+              <a:rPr lang="en-GB" dirty="0"/>
+              <a:t> les </a:t>
+            </a:r>
+            <a:r>
+              <a:rPr lang="en-GB" dirty="0" err="1"/>
+              <a:t>produits</a:t>
+            </a:r>
+            <a:r>
+              <a:rPr lang="en-GB" dirty="0"/>
+              <a:t> d'un </a:t>
+            </a:r>
+            <a:r>
+              <a:rPr lang="en-GB" dirty="0" err="1"/>
+              <a:t>producteur</a:t>
+            </a:r>
+            <a:r>
+              <a:rPr lang="en-GB" dirty="0"/>
+              <a:t> </a:t>
+            </a:r>
+            <a:r>
+              <a:rPr lang="en-GB" dirty="0" err="1"/>
+              <a:t>spécifique</a:t>
+            </a:r>
+            <a:r>
+              <a:rPr lang="en-GB" dirty="0"/>
+              <a:t> – </a:t>
+            </a:r>
+          </a:p>
+          <a:p>
+            <a:pPr>
+              <a:buFontTx/>
+              <a:buChar char="-"/>
+            </a:pPr>
+            <a:r>
+              <a:rPr lang="en-GB" dirty="0"/>
+              <a:t> En tant </a:t>
+            </a:r>
+            <a:r>
+              <a:rPr lang="en-GB" dirty="0" err="1"/>
+              <a:t>que</a:t>
+            </a:r>
+            <a:r>
+              <a:rPr lang="en-GB" dirty="0"/>
+              <a:t> </a:t>
+            </a:r>
+            <a:r>
+              <a:rPr lang="en-GB" dirty="0" err="1"/>
+              <a:t>visiteur</a:t>
+            </a:r>
+            <a:r>
+              <a:rPr lang="en-GB" dirty="0"/>
+              <a:t>, je </a:t>
+            </a:r>
+            <a:r>
+              <a:rPr lang="en-GB" dirty="0" err="1"/>
+              <a:t>peux</a:t>
+            </a:r>
+            <a:r>
+              <a:rPr lang="en-GB" dirty="0"/>
+              <a:t> </a:t>
+            </a:r>
+            <a:r>
+              <a:rPr lang="en-GB" dirty="0" err="1"/>
+              <a:t>contacter</a:t>
+            </a:r>
+            <a:r>
+              <a:rPr lang="en-GB" dirty="0"/>
+              <a:t> un </a:t>
+            </a:r>
+            <a:r>
+              <a:rPr lang="en-GB" dirty="0" err="1"/>
+              <a:t>producteur</a:t>
+            </a:r>
+            <a:r>
+              <a:rPr lang="en-GB" dirty="0"/>
+              <a:t> via son email</a:t>
+            </a:r>
+          </a:p>
+        </p:txBody>
+      </p:sp>
+      <p:sp>
+        <p:nvSpPr>
+          <p:cNvPr id="4" name="TextBox 3">
+            <a:extLst>
+              <a:ext uri="{FF2B5EF4-FFF2-40B4-BE49-F238E27FC236}">
+                <a16:creationId xmlns:a16="http://schemas.microsoft.com/office/drawing/2014/main" id="{F7A17894-079F-36EF-B2E1-37898B8FC3AF}"/>
+              </a:ext>
+            </a:extLst>
+          </p:cNvPr>
+          <p:cNvSpPr txBox="1"/>
+          <p:nvPr/>
+        </p:nvSpPr>
+        <p:spPr>
+          <a:xfrm>
+            <a:off x="6495046" y="1489871"/>
+            <a:ext cx="5535319" cy="3046988"/>
+          </a:xfrm>
+          <a:prstGeom prst="rect">
+            <a:avLst/>
+          </a:prstGeom>
+          <a:noFill/>
+        </p:spPr>
+        <p:txBody>
+          <a:bodyPr wrap="square" rtlCol="0">
+            <a:spAutoFit/>
+          </a:bodyPr>
+          <a:lstStyle/>
+          <a:p>
+            <a:r>
+              <a:rPr lang="en-GB" sz="1200" dirty="0"/>
+              <a:t>Panier</a:t>
+            </a:r>
+          </a:p>
+          <a:p>
+            <a:pPr>
+              <a:buFontTx/>
+              <a:buChar char="-"/>
+            </a:pPr>
+            <a:r>
+              <a:rPr lang="en-GB" sz="1200" dirty="0"/>
+              <a:t> En tant </a:t>
+            </a:r>
+            <a:r>
+              <a:rPr lang="en-GB" sz="1200" dirty="0" err="1"/>
+              <a:t>que</a:t>
+            </a:r>
+            <a:r>
+              <a:rPr lang="en-GB" sz="1200" dirty="0"/>
+              <a:t> </a:t>
+            </a:r>
+            <a:r>
+              <a:rPr lang="en-GB" sz="1200" dirty="0" err="1"/>
+              <a:t>visiteur</a:t>
+            </a:r>
+            <a:r>
+              <a:rPr lang="en-GB" sz="1200" dirty="0"/>
+              <a:t>, je </a:t>
+            </a:r>
+            <a:r>
+              <a:rPr lang="en-GB" sz="1200" dirty="0" err="1"/>
+              <a:t>peux</a:t>
+            </a:r>
+            <a:r>
+              <a:rPr lang="en-GB" sz="1200" dirty="0"/>
+              <a:t> </a:t>
+            </a:r>
+            <a:r>
+              <a:rPr lang="en-GB" sz="1200" dirty="0" err="1"/>
+              <a:t>ajouter</a:t>
+            </a:r>
+            <a:r>
+              <a:rPr lang="en-GB" sz="1200" dirty="0"/>
+              <a:t> un </a:t>
+            </a:r>
+            <a:r>
+              <a:rPr lang="en-GB" sz="1200" dirty="0" err="1"/>
+              <a:t>produit</a:t>
+            </a:r>
+            <a:r>
+              <a:rPr lang="en-GB" sz="1200" dirty="0"/>
+              <a:t> au panier </a:t>
+            </a:r>
+          </a:p>
+          <a:p>
+            <a:pPr>
+              <a:buFontTx/>
+              <a:buChar char="-"/>
+            </a:pPr>
+            <a:r>
+              <a:rPr lang="en-GB" sz="1200" dirty="0"/>
+              <a:t>En tant </a:t>
+            </a:r>
+            <a:r>
+              <a:rPr lang="en-GB" sz="1200" dirty="0" err="1"/>
+              <a:t>que</a:t>
+            </a:r>
+            <a:r>
+              <a:rPr lang="en-GB" sz="1200" dirty="0"/>
+              <a:t> </a:t>
+            </a:r>
+            <a:r>
+              <a:rPr lang="en-GB" sz="1200" dirty="0" err="1"/>
+              <a:t>visiteur</a:t>
+            </a:r>
+            <a:r>
+              <a:rPr lang="en-GB" sz="1200" dirty="0"/>
+              <a:t>, je </a:t>
+            </a:r>
+            <a:r>
+              <a:rPr lang="en-GB" sz="1200" dirty="0" err="1"/>
+              <a:t>peux</a:t>
+            </a:r>
+            <a:r>
+              <a:rPr lang="en-GB" sz="1200" dirty="0"/>
+              <a:t> voir le </a:t>
+            </a:r>
+            <a:r>
+              <a:rPr lang="en-GB" sz="1200" dirty="0" err="1"/>
+              <a:t>contenu</a:t>
+            </a:r>
+            <a:r>
+              <a:rPr lang="en-GB" sz="1200" dirty="0"/>
+              <a:t> de </a:t>
+            </a:r>
+            <a:r>
+              <a:rPr lang="en-GB" sz="1200" dirty="0" err="1"/>
+              <a:t>mon</a:t>
+            </a:r>
+            <a:r>
+              <a:rPr lang="en-GB" sz="1200" dirty="0"/>
+              <a:t> panier </a:t>
+            </a:r>
+          </a:p>
+          <a:p>
+            <a:pPr>
+              <a:buFontTx/>
+              <a:buChar char="-"/>
+            </a:pPr>
+            <a:r>
+              <a:rPr lang="en-GB" sz="1200" dirty="0"/>
+              <a:t>En tant </a:t>
+            </a:r>
+            <a:r>
+              <a:rPr lang="en-GB" sz="1200" dirty="0" err="1"/>
+              <a:t>que</a:t>
+            </a:r>
+            <a:r>
+              <a:rPr lang="en-GB" sz="1200" dirty="0"/>
+              <a:t> </a:t>
+            </a:r>
+            <a:r>
+              <a:rPr lang="en-GB" sz="1200" dirty="0" err="1"/>
+              <a:t>visiteur</a:t>
+            </a:r>
+            <a:r>
+              <a:rPr lang="en-GB" sz="1200" dirty="0"/>
+              <a:t>, je </a:t>
+            </a:r>
+            <a:r>
+              <a:rPr lang="en-GB" sz="1200" dirty="0" err="1"/>
+              <a:t>peux</a:t>
+            </a:r>
+            <a:r>
+              <a:rPr lang="en-GB" sz="1200" dirty="0"/>
+              <a:t> modifier la </a:t>
+            </a:r>
+            <a:r>
+              <a:rPr lang="en-GB" sz="1200" dirty="0" err="1"/>
+              <a:t>quantité</a:t>
+            </a:r>
+            <a:r>
+              <a:rPr lang="en-GB" sz="1200" dirty="0"/>
+              <a:t> d'un </a:t>
+            </a:r>
+            <a:r>
+              <a:rPr lang="en-GB" sz="1200" dirty="0" err="1"/>
+              <a:t>produit</a:t>
+            </a:r>
+            <a:r>
+              <a:rPr lang="en-GB" sz="1200" dirty="0"/>
+              <a:t> dans </a:t>
+            </a:r>
+            <a:r>
+              <a:rPr lang="en-GB" sz="1200" dirty="0" err="1"/>
+              <a:t>mon</a:t>
+            </a:r>
+            <a:r>
+              <a:rPr lang="en-GB" sz="1200" dirty="0"/>
+              <a:t> panier </a:t>
+            </a:r>
+          </a:p>
+          <a:p>
+            <a:r>
+              <a:rPr lang="en-GB" sz="1200" dirty="0"/>
+              <a:t>- En tant </a:t>
+            </a:r>
+            <a:r>
+              <a:rPr lang="en-GB" sz="1200" dirty="0" err="1"/>
+              <a:t>que</a:t>
+            </a:r>
+            <a:r>
+              <a:rPr lang="en-GB" sz="1200" dirty="0"/>
+              <a:t> </a:t>
+            </a:r>
+            <a:r>
+              <a:rPr lang="en-GB" sz="1200" dirty="0" err="1"/>
+              <a:t>visiteur</a:t>
+            </a:r>
+            <a:r>
+              <a:rPr lang="en-GB" sz="1200" dirty="0"/>
+              <a:t>, je </a:t>
+            </a:r>
+            <a:r>
+              <a:rPr lang="en-GB" sz="1200" dirty="0" err="1"/>
+              <a:t>peux</a:t>
+            </a:r>
+            <a:r>
+              <a:rPr lang="en-GB" sz="1200" dirty="0"/>
+              <a:t> </a:t>
+            </a:r>
+            <a:r>
+              <a:rPr lang="en-GB" sz="1200" dirty="0" err="1"/>
+              <a:t>retirer</a:t>
+            </a:r>
+            <a:r>
+              <a:rPr lang="en-GB" sz="1200" dirty="0"/>
+              <a:t> un </a:t>
+            </a:r>
+            <a:r>
+              <a:rPr lang="en-GB" sz="1200" dirty="0" err="1"/>
+              <a:t>produit</a:t>
+            </a:r>
+            <a:r>
+              <a:rPr lang="en-GB" sz="1200" dirty="0"/>
+              <a:t> de </a:t>
+            </a:r>
+            <a:r>
+              <a:rPr lang="en-GB" sz="1200" dirty="0" err="1"/>
+              <a:t>mon</a:t>
+            </a:r>
+            <a:r>
+              <a:rPr lang="en-GB" sz="1200" dirty="0"/>
+              <a:t> panier </a:t>
+            </a:r>
+          </a:p>
+          <a:p>
+            <a:r>
+              <a:rPr lang="en-GB" sz="1200" dirty="0"/>
+              <a:t>- En tant </a:t>
+            </a:r>
+            <a:r>
+              <a:rPr lang="en-GB" sz="1200" dirty="0" err="1"/>
+              <a:t>que</a:t>
+            </a:r>
+            <a:r>
+              <a:rPr lang="en-GB" sz="1200" dirty="0"/>
+              <a:t> </a:t>
+            </a:r>
+            <a:r>
+              <a:rPr lang="en-GB" sz="1200" dirty="0" err="1"/>
+              <a:t>visiteur</a:t>
+            </a:r>
+            <a:r>
+              <a:rPr lang="en-GB" sz="1200" dirty="0"/>
+              <a:t>, je </a:t>
+            </a:r>
+            <a:r>
+              <a:rPr lang="en-GB" sz="1200" dirty="0" err="1"/>
+              <a:t>peux</a:t>
+            </a:r>
+            <a:r>
+              <a:rPr lang="en-GB" sz="1200" dirty="0"/>
+              <a:t> voir le total de </a:t>
+            </a:r>
+            <a:r>
+              <a:rPr lang="en-GB" sz="1200" dirty="0" err="1"/>
+              <a:t>mon</a:t>
+            </a:r>
+            <a:r>
+              <a:rPr lang="en-GB" sz="1200" dirty="0"/>
+              <a:t> panier </a:t>
+            </a:r>
+          </a:p>
+          <a:p>
+            <a:r>
+              <a:rPr lang="en-GB" sz="1200" dirty="0"/>
+              <a:t>- En tant </a:t>
+            </a:r>
+            <a:r>
+              <a:rPr lang="en-GB" sz="1200" dirty="0" err="1"/>
+              <a:t>que</a:t>
+            </a:r>
+            <a:r>
+              <a:rPr lang="en-GB" sz="1200" dirty="0"/>
+              <a:t> </a:t>
+            </a:r>
+            <a:r>
+              <a:rPr lang="en-GB" sz="1200" dirty="0" err="1"/>
+              <a:t>visiteur</a:t>
+            </a:r>
+            <a:r>
+              <a:rPr lang="en-GB" sz="1200" dirty="0"/>
+              <a:t>, je </a:t>
+            </a:r>
+            <a:r>
+              <a:rPr lang="en-GB" sz="1200" dirty="0" err="1"/>
+              <a:t>peux</a:t>
+            </a:r>
+            <a:r>
+              <a:rPr lang="en-GB" sz="1200" dirty="0"/>
+              <a:t> </a:t>
+            </a:r>
+            <a:r>
+              <a:rPr lang="en-GB" sz="1200" dirty="0" err="1"/>
+              <a:t>vider</a:t>
+            </a:r>
+            <a:r>
+              <a:rPr lang="en-GB" sz="1200" dirty="0"/>
+              <a:t> </a:t>
+            </a:r>
+            <a:r>
+              <a:rPr lang="en-GB" sz="1200" dirty="0" err="1"/>
+              <a:t>entièrement</a:t>
+            </a:r>
+            <a:r>
+              <a:rPr lang="en-GB" sz="1200" dirty="0"/>
+              <a:t> </a:t>
+            </a:r>
+            <a:r>
+              <a:rPr lang="en-GB" sz="1200" dirty="0" err="1"/>
+              <a:t>mon</a:t>
+            </a:r>
+            <a:r>
+              <a:rPr lang="en-GB" sz="1200" dirty="0"/>
+              <a:t> panier </a:t>
+            </a:r>
+          </a:p>
+          <a:p>
+            <a:r>
+              <a:rPr lang="en-GB" sz="1200" dirty="0"/>
+              <a:t>- En tant </a:t>
+            </a:r>
+            <a:r>
+              <a:rPr lang="en-GB" sz="1200" dirty="0" err="1"/>
+              <a:t>que</a:t>
+            </a:r>
+            <a:r>
+              <a:rPr lang="en-GB" sz="1200" dirty="0"/>
+              <a:t> </a:t>
+            </a:r>
+            <a:r>
+              <a:rPr lang="en-GB" sz="1200" dirty="0" err="1"/>
+              <a:t>visiteur</a:t>
+            </a:r>
+            <a:r>
+              <a:rPr lang="en-GB" sz="1200" dirty="0"/>
+              <a:t>, </a:t>
+            </a:r>
+            <a:r>
+              <a:rPr lang="en-GB" sz="1200" dirty="0" err="1"/>
+              <a:t>mon</a:t>
+            </a:r>
+            <a:r>
+              <a:rPr lang="en-GB" sz="1200" dirty="0"/>
+              <a:t> panier </a:t>
+            </a:r>
+            <a:r>
+              <a:rPr lang="en-GB" sz="1200" dirty="0" err="1"/>
+              <a:t>persiste</a:t>
+            </a:r>
+            <a:r>
+              <a:rPr lang="en-GB" sz="1200" dirty="0"/>
+              <a:t> pendant ma session de navigation</a:t>
+            </a:r>
+          </a:p>
+          <a:p>
+            <a:pPr marL="285750" indent="-285750">
+              <a:buFontTx/>
+              <a:buChar char="-"/>
+            </a:pPr>
+            <a:endParaRPr lang="en-GB" sz="1200" dirty="0"/>
+          </a:p>
+          <a:p>
+            <a:r>
+              <a:rPr lang="en-GB" sz="1200" dirty="0"/>
+              <a:t>Information &amp; Communication</a:t>
+            </a:r>
+          </a:p>
+          <a:p>
+            <a:pPr marL="285750" indent="-285750">
+              <a:buFontTx/>
+              <a:buChar char="-"/>
+            </a:pPr>
+            <a:r>
+              <a:rPr lang="en-GB" sz="1200" dirty="0"/>
+              <a:t>En tant </a:t>
+            </a:r>
+            <a:r>
+              <a:rPr lang="en-GB" sz="1200" dirty="0" err="1"/>
+              <a:t>que</a:t>
+            </a:r>
+            <a:r>
+              <a:rPr lang="en-GB" sz="1200" dirty="0"/>
+              <a:t> </a:t>
+            </a:r>
+            <a:r>
+              <a:rPr lang="en-GB" sz="1200" dirty="0" err="1"/>
+              <a:t>visiteur</a:t>
+            </a:r>
+            <a:r>
+              <a:rPr lang="en-GB" sz="1200" dirty="0"/>
+              <a:t>, je </a:t>
+            </a:r>
+            <a:r>
+              <a:rPr lang="en-GB" sz="1200" dirty="0" err="1"/>
+              <a:t>peux</a:t>
+            </a:r>
+            <a:r>
+              <a:rPr lang="en-GB" sz="1200" dirty="0"/>
+              <a:t> </a:t>
+            </a:r>
+            <a:r>
+              <a:rPr lang="en-GB" sz="1200" dirty="0" err="1"/>
+              <a:t>accéder</a:t>
+            </a:r>
+            <a:r>
+              <a:rPr lang="en-GB" sz="1200" dirty="0"/>
+              <a:t> à la page "À </a:t>
+            </a:r>
+            <a:r>
+              <a:rPr lang="en-GB" sz="1200" dirty="0" err="1"/>
+              <a:t>propos</a:t>
+            </a:r>
+            <a:r>
+              <a:rPr lang="en-GB" sz="1200" dirty="0"/>
+              <a:t>" pour </a:t>
+            </a:r>
+            <a:r>
+              <a:rPr lang="en-GB" sz="1200" dirty="0" err="1"/>
+              <a:t>en</a:t>
+            </a:r>
+            <a:r>
+              <a:rPr lang="en-GB" sz="1200" dirty="0"/>
+              <a:t> savoir plus sur le Comptoir Local </a:t>
+            </a:r>
+          </a:p>
+          <a:p>
+            <a:pPr marL="285750" indent="-285750">
+              <a:buFontTx/>
+              <a:buChar char="-"/>
+            </a:pPr>
+            <a:r>
+              <a:rPr lang="en-GB" sz="1200" dirty="0"/>
+              <a:t>En tant </a:t>
+            </a:r>
+            <a:r>
+              <a:rPr lang="en-GB" sz="1200" dirty="0" err="1"/>
+              <a:t>que</a:t>
+            </a:r>
+            <a:r>
+              <a:rPr lang="en-GB" sz="1200" dirty="0"/>
+              <a:t> </a:t>
+            </a:r>
+            <a:r>
+              <a:rPr lang="en-GB" sz="1200" dirty="0" err="1"/>
+              <a:t>visiteur</a:t>
+            </a:r>
+            <a:r>
+              <a:rPr lang="en-GB" sz="1200" dirty="0"/>
+              <a:t>, je </a:t>
+            </a:r>
+            <a:r>
+              <a:rPr lang="en-GB" sz="1200" dirty="0" err="1"/>
+              <a:t>peux</a:t>
+            </a:r>
+            <a:r>
+              <a:rPr lang="en-GB" sz="1200" dirty="0"/>
+              <a:t> voir les </a:t>
+            </a:r>
+            <a:r>
+              <a:rPr lang="en-GB" sz="1200" dirty="0" err="1"/>
+              <a:t>valeurs</a:t>
+            </a:r>
+            <a:r>
+              <a:rPr lang="en-GB" sz="1200" dirty="0"/>
+              <a:t> de </a:t>
+            </a:r>
+            <a:r>
+              <a:rPr lang="en-GB" sz="1200" dirty="0" err="1"/>
+              <a:t>l'entreprise</a:t>
+            </a:r>
+            <a:r>
+              <a:rPr lang="en-GB" sz="1200" dirty="0"/>
+              <a:t> (local, </a:t>
+            </a:r>
+            <a:r>
+              <a:rPr lang="en-GB" sz="1200" dirty="0" err="1"/>
+              <a:t>qualité</a:t>
+            </a:r>
+            <a:r>
+              <a:rPr lang="en-GB" sz="1200" dirty="0"/>
+              <a:t>,  </a:t>
+            </a:r>
+            <a:r>
+              <a:rPr lang="en-GB" sz="1200" dirty="0" err="1"/>
+              <a:t>transparence</a:t>
+            </a:r>
+            <a:r>
+              <a:rPr lang="en-GB" sz="1200" dirty="0"/>
+              <a:t>)</a:t>
+            </a:r>
+          </a:p>
+          <a:p>
+            <a:pPr marL="285750" indent="-285750">
+              <a:buFontTx/>
+              <a:buChar char="-"/>
+            </a:pPr>
+            <a:r>
+              <a:rPr lang="en-GB" sz="1200" dirty="0"/>
+              <a:t>En tant </a:t>
+            </a:r>
+            <a:r>
+              <a:rPr lang="en-GB" sz="1200" dirty="0" err="1"/>
+              <a:t>que</a:t>
+            </a:r>
+            <a:r>
+              <a:rPr lang="en-GB" sz="1200" dirty="0"/>
+              <a:t> </a:t>
+            </a:r>
+            <a:r>
+              <a:rPr lang="en-GB" sz="1200" dirty="0" err="1"/>
+              <a:t>visiteur</a:t>
+            </a:r>
+            <a:r>
+              <a:rPr lang="en-GB" sz="1200" dirty="0"/>
+              <a:t>, je </a:t>
+            </a:r>
+            <a:r>
+              <a:rPr lang="en-GB" sz="1200" dirty="0" err="1"/>
+              <a:t>peux</a:t>
+            </a:r>
+            <a:r>
+              <a:rPr lang="en-GB" sz="1200" dirty="0"/>
+              <a:t> voir les </a:t>
+            </a:r>
+            <a:r>
+              <a:rPr lang="en-GB" sz="1200" dirty="0" err="1"/>
+              <a:t>informations</a:t>
+            </a:r>
+            <a:r>
+              <a:rPr lang="en-GB" sz="1200" dirty="0"/>
+              <a:t> de contact du Comptoir Local</a:t>
+            </a:r>
+          </a:p>
+          <a:p>
+            <a:endParaRPr lang="en-FR" sz="1200" dirty="0"/>
+          </a:p>
+        </p:txBody>
+      </p:sp>
+    </p:spTree>
+    <p:extLst>
+      <p:ext uri="{BB962C8B-B14F-4D97-AF65-F5344CB8AC3E}">
+        <p14:creationId xmlns:p14="http://schemas.microsoft.com/office/powerpoint/2010/main" val="3299008306"/>
+      </p:ext>
+    </p:extLst>
+  </p:cSld>
+  <p:clrMapOvr>
+    <a:masterClrMapping/>
+  </p:clrMapOvr>
+</p:sld>
+</file>
+
+<file path=ppt/slides/slide16.xml><?xml version="1.0" encoding="utf-8"?>
+<p:sld xmlns:a="http://schemas.openxmlformats.org/drawingml/2006/main" xmlns:r="http://schemas.openxmlformats.org/officeDocument/2006/relationships" xmlns:p="http://schemas.openxmlformats.org/presentationml/2006/main">
+  <p:cSld>
+    <p:spTree>
+      <p:nvGrpSpPr>
+        <p:cNvPr id="1" name=""/>
+        <p:cNvGrpSpPr/>
+        <p:nvPr/>
+      </p:nvGrpSpPr>
+      <p:grpSpPr>
+        <a:xfrm>
+          <a:off x="0" y="0"/>
+          <a:ext cx="0" cy="0"/>
+          <a:chOff x="0" y="0"/>
+          <a:chExt cx="0" cy="0"/>
+        </a:xfrm>
+      </p:grpSpPr>
+      <p:sp>
+        <p:nvSpPr>
+          <p:cNvPr id="2" name="Title 1">
+            <a:extLst>
+              <a:ext uri="{FF2B5EF4-FFF2-40B4-BE49-F238E27FC236}">
+                <a16:creationId xmlns:a16="http://schemas.microsoft.com/office/drawing/2014/main" id="{309D196B-32C8-6AE1-CB2E-3192D7C80474}"/>
+              </a:ext>
+            </a:extLst>
+          </p:cNvPr>
+          <p:cNvSpPr>
+            <a:spLocks noGrp="1"/>
+          </p:cNvSpPr>
+          <p:nvPr>
+            <p:ph type="title"/>
+          </p:nvPr>
+        </p:nvSpPr>
+        <p:spPr/>
+        <p:txBody>
+          <a:bodyPr/>
+          <a:lstStyle/>
+          <a:p>
+            <a:endParaRPr lang="en-FR"/>
+          </a:p>
+        </p:txBody>
+      </p:sp>
+      <p:sp>
+        <p:nvSpPr>
+          <p:cNvPr id="3" name="Content Placeholder 2">
+            <a:extLst>
+              <a:ext uri="{FF2B5EF4-FFF2-40B4-BE49-F238E27FC236}">
+                <a16:creationId xmlns:a16="http://schemas.microsoft.com/office/drawing/2014/main" id="{DC3A3E48-D424-28A2-E46C-3E8888C9AC39}"/>
+              </a:ext>
+            </a:extLst>
+          </p:cNvPr>
+          <p:cNvSpPr>
+            <a:spLocks noGrp="1"/>
+          </p:cNvSpPr>
+          <p:nvPr>
+            <p:ph idx="1"/>
+          </p:nvPr>
+        </p:nvSpPr>
+        <p:spPr/>
+        <p:txBody>
+          <a:bodyPr/>
+          <a:lstStyle/>
+          <a:p>
+            <a:endParaRPr lang="en-FR"/>
+          </a:p>
+        </p:txBody>
+      </p:sp>
+    </p:spTree>
+    <p:extLst>
+      <p:ext uri="{BB962C8B-B14F-4D97-AF65-F5344CB8AC3E}">
+        <p14:creationId xmlns:p14="http://schemas.microsoft.com/office/powerpoint/2010/main" val="2719688519"/>
+      </p:ext>
+    </p:extLst>
+  </p:cSld>
+  <p:clrMapOvr>
+    <a:masterClrMapping/>
+  </p:clrMapOvr>
+</p:sld>
+</file>
+
+<file path=ppt/slides/slide17.xml><?xml version="1.0" encoding="utf-8"?>
+<p:sld xmlns:a="http://schemas.openxmlformats.org/drawingml/2006/main" xmlns:r="http://schemas.openxmlformats.org/officeDocument/2006/relationships" xmlns:p="http://schemas.openxmlformats.org/presentationml/2006/main">
+  <p:cSld>
+    <p:spTree>
+      <p:nvGrpSpPr>
+        <p:cNvPr id="1" name=""/>
+        <p:cNvGrpSpPr/>
+        <p:nvPr/>
+      </p:nvGrpSpPr>
+      <p:grpSpPr>
+        <a:xfrm>
+          <a:off x="0" y="0"/>
+          <a:ext cx="0" cy="0"/>
+          <a:chOff x="0" y="0"/>
+          <a:chExt cx="0" cy="0"/>
+        </a:xfrm>
+      </p:grpSpPr>
+      <p:sp>
+        <p:nvSpPr>
+          <p:cNvPr id="2" name="Title 1">
+            <a:extLst>
+              <a:ext uri="{FF2B5EF4-FFF2-40B4-BE49-F238E27FC236}">
+                <a16:creationId xmlns:a16="http://schemas.microsoft.com/office/drawing/2014/main" id="{A2664CE0-E50E-274F-8AAE-CF70F08385D9}"/>
+              </a:ext>
+            </a:extLst>
+          </p:cNvPr>
+          <p:cNvSpPr>
+            <a:spLocks noGrp="1"/>
+          </p:cNvSpPr>
+          <p:nvPr>
+            <p:ph type="title"/>
+          </p:nvPr>
+        </p:nvSpPr>
+        <p:spPr/>
+        <p:txBody>
+          <a:bodyPr/>
+          <a:lstStyle/>
+          <a:p>
+            <a:r>
+              <a:rPr lang="en-FR" dirty="0"/>
+              <a:t>WEEK 2 - MVP INITIAL</a:t>
+            </a:r>
+          </a:p>
+        </p:txBody>
+      </p:sp>
+      <p:pic>
+        <p:nvPicPr>
+          <p:cNvPr id="4" name="Picture 3">
+            <a:extLst>
+              <a:ext uri="{FF2B5EF4-FFF2-40B4-BE49-F238E27FC236}">
+                <a16:creationId xmlns:a16="http://schemas.microsoft.com/office/drawing/2014/main" id="{FE445C3D-18CD-BDF9-80AC-368721E37819}"/>
+              </a:ext>
+            </a:extLst>
+          </p:cNvPr>
+          <p:cNvPicPr>
+            <a:picLocks noChangeAspect="1"/>
+          </p:cNvPicPr>
+          <p:nvPr/>
+        </p:nvPicPr>
+        <p:blipFill>
+          <a:blip r:embed="rId2"/>
+          <a:stretch>
+            <a:fillRect/>
+          </a:stretch>
+        </p:blipFill>
+        <p:spPr>
+          <a:xfrm>
+            <a:off x="2209800" y="1928524"/>
+            <a:ext cx="7772400" cy="4116943"/>
+          </a:xfrm>
+          <a:prstGeom prst="rect">
+            <a:avLst/>
+          </a:prstGeom>
+        </p:spPr>
+      </p:pic>
+    </p:spTree>
+    <p:extLst>
+      <p:ext uri="{BB962C8B-B14F-4D97-AF65-F5344CB8AC3E}">
+        <p14:creationId xmlns:p14="http://schemas.microsoft.com/office/powerpoint/2010/main" val="278888640"/>
+      </p:ext>
+    </p:extLst>
+  </p:cSld>
+  <p:clrMapOvr>
+    <a:masterClrMapping/>
+  </p:clrMapOvr>
+</p:sld>
+</file>
+
+<file path=ppt/slides/slide18.xml><?xml version="1.0" encoding="utf-8"?>
+<p:sld xmlns:a="http://schemas.openxmlformats.org/drawingml/2006/main" xmlns:r="http://schemas.openxmlformats.org/officeDocument/2006/relationships" xmlns:p="http://schemas.openxmlformats.org/presentationml/2006/main">
+  <p:cSld>
+    <p:spTree>
+      <p:nvGrpSpPr>
+        <p:cNvPr id="1" name=""/>
+        <p:cNvGrpSpPr/>
+        <p:nvPr/>
+      </p:nvGrpSpPr>
+      <p:grpSpPr>
+        <a:xfrm>
+          <a:off x="0" y="0"/>
+          <a:ext cx="0" cy="0"/>
+          <a:chOff x="0" y="0"/>
+          <a:chExt cx="0" cy="0"/>
+        </a:xfrm>
+      </p:grpSpPr>
+      <p:sp>
+        <p:nvSpPr>
+          <p:cNvPr id="2" name="Title 1">
+            <a:extLst>
+              <a:ext uri="{FF2B5EF4-FFF2-40B4-BE49-F238E27FC236}">
+                <a16:creationId xmlns:a16="http://schemas.microsoft.com/office/drawing/2014/main" id="{90809D17-6DEE-0162-1052-DC6D5ABFF405}"/>
+              </a:ext>
+            </a:extLst>
+          </p:cNvPr>
+          <p:cNvSpPr>
+            <a:spLocks noGrp="1"/>
+          </p:cNvSpPr>
+          <p:nvPr>
+            <p:ph type="title"/>
+          </p:nvPr>
+        </p:nvSpPr>
+        <p:spPr/>
+        <p:txBody>
+          <a:bodyPr/>
+          <a:lstStyle/>
+          <a:p>
+            <a:r>
+              <a:rPr lang="en-FR" dirty="0"/>
+              <a:t>WEEK 2 - MVP INITIAL</a:t>
+            </a:r>
+          </a:p>
+        </p:txBody>
+      </p:sp>
+      <p:pic>
+        <p:nvPicPr>
+          <p:cNvPr id="4" name="Content Placeholder 3">
+            <a:extLst>
+              <a:ext uri="{FF2B5EF4-FFF2-40B4-BE49-F238E27FC236}">
+                <a16:creationId xmlns:a16="http://schemas.microsoft.com/office/drawing/2014/main" id="{D01B256A-1EA9-A764-6E25-C936E597B194}"/>
+              </a:ext>
+            </a:extLst>
+          </p:cNvPr>
+          <p:cNvPicPr>
+            <a:picLocks noGrp="1" noChangeAspect="1"/>
+          </p:cNvPicPr>
+          <p:nvPr>
+            <p:ph idx="1"/>
+          </p:nvPr>
+        </p:nvPicPr>
+        <p:blipFill>
+          <a:blip r:embed="rId2"/>
+          <a:stretch>
+            <a:fillRect/>
+          </a:stretch>
+        </p:blipFill>
+        <p:spPr>
+          <a:xfrm>
+            <a:off x="2184385" y="2065867"/>
+            <a:ext cx="7823230" cy="4046077"/>
+          </a:xfrm>
+          <a:prstGeom prst="rect">
+            <a:avLst/>
+          </a:prstGeom>
+        </p:spPr>
+      </p:pic>
+    </p:spTree>
+    <p:extLst>
+      <p:ext uri="{BB962C8B-B14F-4D97-AF65-F5344CB8AC3E}">
+        <p14:creationId xmlns:p14="http://schemas.microsoft.com/office/powerpoint/2010/main" val="1706721721"/>
+      </p:ext>
+    </p:extLst>
+  </p:cSld>
+  <p:clrMapOvr>
+    <a:masterClrMapping/>
+  </p:clrMapOvr>
+</p:sld>
+</file>
+
+<file path=ppt/slides/slide19.xml><?xml version="1.0" encoding="utf-8"?>
+<p:sld xmlns:a="http://schemas.openxmlformats.org/drawingml/2006/main" xmlns:r="http://schemas.openxmlformats.org/officeDocument/2006/relationships" xmlns:p="http://schemas.openxmlformats.org/presentationml/2006/main">
+  <p:cSld>
+    <p:spTree>
+      <p:nvGrpSpPr>
         <p:cNvPr id="1" name=""/>
         <p:cNvGrpSpPr/>
         <p:nvPr/>
@@ -14520,7 +18130,7 @@
           <p:cNvPr id="2" name="Title 1">
             <a:extLst>
               <a:ext uri="{FF2B5EF4-FFF2-40B4-BE49-F238E27FC236}">
-                <a16:creationId xmlns:a16="http://schemas.microsoft.com/office/drawing/2014/main" id="{FC891427-2D6B-161E-3541-2956F266AE3D}"/>
+                <a16:creationId xmlns:a16="http://schemas.microsoft.com/office/drawing/2014/main" id="{B3F5A5A2-B5BF-0770-3A2D-DD0AD3C4EED9}"/>
               </a:ext>
             </a:extLst>
           </p:cNvPr>
@@ -14531,84 +18141,472 @@
             <p:ph type="title"/>
           </p:nvPr>
         </p:nvSpPr>
-        <p:spPr/>
+        <p:spPr>
+          <a:xfrm>
+            <a:off x="657726" y="104273"/>
+            <a:ext cx="10131425" cy="1456267"/>
+          </a:xfrm>
+        </p:spPr>
         <p:txBody>
           <a:bodyPr/>
           <a:lstStyle/>
           <a:p>
             <a:r>
               <a:rPr lang="en-FR" dirty="0"/>
-              <a:t>MVP Initial : Sans Html</a:t>
+              <a:t>WEEK 1 – SPRINT 2 - Modèle</a:t>
             </a:r>
           </a:p>
         </p:txBody>
       </p:sp>
-      <p:pic>
-        <p:nvPicPr>
-          <p:cNvPr id="4" name="Content Placeholder 3">
+      <p:sp>
+        <p:nvSpPr>
+          <p:cNvPr id="6" name="TextBox 5">
             <a:extLst>
               <a:ext uri="{FF2B5EF4-FFF2-40B4-BE49-F238E27FC236}">
-                <a16:creationId xmlns:a16="http://schemas.microsoft.com/office/drawing/2014/main" id="{F5407583-811C-4C18-2747-0EDA52320EE4}"/>
+                <a16:creationId xmlns:a16="http://schemas.microsoft.com/office/drawing/2014/main" id="{3E8D0F5B-AFCA-14D1-6482-3EC757B327A6}"/>
               </a:ext>
             </a:extLst>
           </p:cNvPr>
-          <p:cNvPicPr>
-            <a:picLocks noGrp="1" noChangeAspect="1"/>
-          </p:cNvPicPr>
-          <p:nvPr>
-            <p:ph idx="1"/>
-          </p:nvPr>
-        </p:nvPicPr>
-        <p:blipFill>
-          <a:blip r:embed="rId2"/>
-          <a:stretch>
-            <a:fillRect/>
-          </a:stretch>
-        </p:blipFill>
+          <p:cNvSpPr txBox="1"/>
+          <p:nvPr/>
+        </p:nvSpPr>
         <p:spPr>
           <a:xfrm>
-            <a:off x="685800" y="2335086"/>
-            <a:ext cx="10131425" cy="3262566"/>
+            <a:off x="583532" y="2228671"/>
+            <a:ext cx="3045995" cy="1200329"/>
           </a:xfrm>
           <a:prstGeom prst="rect">
             <a:avLst/>
           </a:prstGeom>
+          <a:noFill/>
         </p:spPr>
-      </p:pic>
-      <p:pic>
-        <p:nvPicPr>
-          <p:cNvPr id="5" name="Picture 4">
+        <p:txBody>
+          <a:bodyPr wrap="square">
+            <a:spAutoFit/>
+          </a:bodyPr>
+          <a:lstStyle/>
+          <a:p>
+            <a:pPr>
+              <a:buNone/>
+            </a:pPr>
+            <a:r>
+              <a:rPr lang="en-GB" b="1" dirty="0">
+                <a:effectLst/>
+                <a:latin typeface="Helvetica Neue" panose="02000503000000020004" pitchFamily="2" charset="0"/>
+              </a:rPr>
+              <a:t>Producer (</a:t>
+            </a:r>
+            <a:r>
+              <a:rPr lang="en-GB" b="1" dirty="0" err="1">
+                <a:effectLst/>
+                <a:latin typeface="Helvetica Neue" panose="02000503000000020004" pitchFamily="2" charset="0"/>
+              </a:rPr>
+              <a:t>Producteur</a:t>
+            </a:r>
+            <a:r>
+              <a:rPr lang="en-GB" b="1" dirty="0">
+                <a:effectLst/>
+                <a:latin typeface="Helvetica Neue" panose="02000503000000020004" pitchFamily="2" charset="0"/>
+              </a:rPr>
+              <a:t>)</a:t>
+            </a:r>
+            <a:endParaRPr lang="en-GB" dirty="0">
+              <a:effectLst/>
+              <a:latin typeface="Helvetica Neue" panose="02000503000000020004" pitchFamily="2" charset="0"/>
+            </a:endParaRPr>
+          </a:p>
+          <a:p>
+            <a:pPr>
+              <a:buNone/>
+            </a:pPr>
+            <a:r>
+              <a:rPr lang="en-GB" dirty="0">
+                <a:effectLst/>
+                <a:latin typeface="Helvetica Neue" panose="02000503000000020004" pitchFamily="2" charset="0"/>
+              </a:rPr>
+              <a:t>- id: Integer (PK)</a:t>
+            </a:r>
+          </a:p>
+          <a:p>
+            <a:pPr>
+              <a:buNone/>
+            </a:pPr>
+            <a:r>
+              <a:rPr lang="en-GB" dirty="0">
+                <a:effectLst/>
+                <a:latin typeface="Helvetica Neue" panose="02000503000000020004" pitchFamily="2" charset="0"/>
+              </a:rPr>
+              <a:t>- name: String(120) [unique]</a:t>
+            </a:r>
+          </a:p>
+          <a:p>
+            <a:pPr>
+              <a:buNone/>
+            </a:pPr>
+            <a:r>
+              <a:rPr lang="en-GB" dirty="0">
+                <a:effectLst/>
+                <a:latin typeface="Helvetica Neue" panose="02000503000000020004" pitchFamily="2" charset="0"/>
+              </a:rPr>
+              <a:t>- email: Email [optional]</a:t>
+            </a:r>
+          </a:p>
+        </p:txBody>
+      </p:sp>
+      <p:sp>
+        <p:nvSpPr>
+          <p:cNvPr id="7" name="TextBox 6">
             <a:extLst>
               <a:ext uri="{FF2B5EF4-FFF2-40B4-BE49-F238E27FC236}">
-                <a16:creationId xmlns:a16="http://schemas.microsoft.com/office/drawing/2014/main" id="{D2DC67EC-0C36-1E03-75DB-66D3AD4AE1CD}"/>
+                <a16:creationId xmlns:a16="http://schemas.microsoft.com/office/drawing/2014/main" id="{AA0D701A-7E15-DB82-21C0-4C95E31BDC35}"/>
               </a:ext>
             </a:extLst>
           </p:cNvPr>
-          <p:cNvPicPr>
-            <a:picLocks noChangeAspect="1"/>
-          </p:cNvPicPr>
+          <p:cNvSpPr txBox="1"/>
           <p:nvPr/>
-        </p:nvPicPr>
-        <p:blipFill>
-          <a:blip r:embed="rId3"/>
-          <a:stretch>
-            <a:fillRect/>
-          </a:stretch>
-        </p:blipFill>
+        </p:nvSpPr>
         <p:spPr>
           <a:xfrm>
-            <a:off x="2739190" y="1466247"/>
-            <a:ext cx="7772400" cy="2500122"/>
+            <a:off x="583532" y="3776471"/>
+            <a:ext cx="4738437" cy="2031325"/>
           </a:xfrm>
           <a:prstGeom prst="rect">
             <a:avLst/>
           </a:prstGeom>
+          <a:noFill/>
         </p:spPr>
-      </p:pic>
+        <p:txBody>
+          <a:bodyPr wrap="square">
+            <a:spAutoFit/>
+          </a:bodyPr>
+          <a:lstStyle/>
+          <a:p>
+            <a:r>
+              <a:rPr lang="en-GB" b="1" dirty="0"/>
+              <a:t>Product (</a:t>
+            </a:r>
+            <a:r>
+              <a:rPr lang="en-GB" b="1" dirty="0" err="1"/>
+              <a:t>Produit</a:t>
+            </a:r>
+            <a:r>
+              <a:rPr lang="en-GB" b="1" dirty="0"/>
+              <a:t>)</a:t>
+            </a:r>
+            <a:endParaRPr lang="en-GB" dirty="0"/>
+          </a:p>
+          <a:p>
+            <a:r>
+              <a:rPr lang="en-GB" dirty="0"/>
+              <a:t>- id: Integer (PK)</a:t>
+            </a:r>
+          </a:p>
+          <a:p>
+            <a:r>
+              <a:rPr lang="en-GB" dirty="0"/>
+              <a:t>- name: String(120)</a:t>
+            </a:r>
+          </a:p>
+          <a:p>
+            <a:r>
+              <a:rPr lang="en-GB" dirty="0"/>
+              <a:t>- price: Decimal(10, 2) [min: 0]</a:t>
+            </a:r>
+          </a:p>
+          <a:p>
+            <a:r>
+              <a:rPr lang="en-GB" dirty="0"/>
+              <a:t>- </a:t>
+            </a:r>
+            <a:r>
+              <a:rPr lang="en-GB" dirty="0" err="1"/>
+              <a:t>stock_quantity</a:t>
+            </a:r>
+            <a:r>
+              <a:rPr lang="en-GB" dirty="0"/>
+              <a:t>: </a:t>
+            </a:r>
+            <a:r>
+              <a:rPr lang="en-GB" dirty="0" err="1"/>
+              <a:t>PositiveInteger</a:t>
+            </a:r>
+            <a:endParaRPr lang="en-GB" dirty="0"/>
+          </a:p>
+          <a:p>
+            <a:r>
+              <a:rPr lang="en-GB" dirty="0"/>
+              <a:t>- producer: </a:t>
+            </a:r>
+            <a:r>
+              <a:rPr lang="en-GB" dirty="0" err="1"/>
+              <a:t>ForeignKey</a:t>
+            </a:r>
+            <a:r>
+              <a:rPr lang="en-GB" dirty="0"/>
+              <a:t>(Producer)</a:t>
+            </a:r>
+          </a:p>
+          <a:p>
+            <a:r>
+              <a:rPr lang="en-GB" dirty="0"/>
+              <a:t>- </a:t>
+            </a:r>
+            <a:r>
+              <a:rPr lang="en-GB" dirty="0" err="1"/>
+              <a:t>unique_together</a:t>
+            </a:r>
+            <a:r>
+              <a:rPr lang="en-GB" dirty="0"/>
+              <a:t>: (name, producer)</a:t>
+            </a:r>
+          </a:p>
+        </p:txBody>
+      </p:sp>
+      <p:sp>
+        <p:nvSpPr>
+          <p:cNvPr id="8" name="TextBox 7">
+            <a:extLst>
+              <a:ext uri="{FF2B5EF4-FFF2-40B4-BE49-F238E27FC236}">
+                <a16:creationId xmlns:a16="http://schemas.microsoft.com/office/drawing/2014/main" id="{BEB46923-5F27-013E-6B57-BD78BCAE409F}"/>
+              </a:ext>
+            </a:extLst>
+          </p:cNvPr>
+          <p:cNvSpPr txBox="1"/>
+          <p:nvPr/>
+        </p:nvSpPr>
+        <p:spPr>
+          <a:xfrm>
+            <a:off x="5723439" y="1628506"/>
+            <a:ext cx="3045995" cy="923330"/>
+          </a:xfrm>
+          <a:prstGeom prst="rect">
+            <a:avLst/>
+          </a:prstGeom>
+          <a:noFill/>
+        </p:spPr>
+        <p:txBody>
+          <a:bodyPr wrap="square">
+            <a:spAutoFit/>
+          </a:bodyPr>
+          <a:lstStyle/>
+          <a:p>
+            <a:r>
+              <a:rPr lang="en-GB" b="1" dirty="0"/>
+              <a:t>Client (Client)</a:t>
+            </a:r>
+            <a:endParaRPr lang="en-GB" dirty="0"/>
+          </a:p>
+          <a:p>
+            <a:r>
+              <a:rPr lang="en-GB" dirty="0"/>
+              <a:t>- id: Integer (PK)</a:t>
+            </a:r>
+          </a:p>
+          <a:p>
+            <a:r>
+              <a:rPr lang="en-GB" dirty="0"/>
+              <a:t>- email: Email [unique]</a:t>
+            </a:r>
+          </a:p>
+        </p:txBody>
+      </p:sp>
+      <p:sp>
+        <p:nvSpPr>
+          <p:cNvPr id="9" name="TextBox 8">
+            <a:extLst>
+              <a:ext uri="{FF2B5EF4-FFF2-40B4-BE49-F238E27FC236}">
+                <a16:creationId xmlns:a16="http://schemas.microsoft.com/office/drawing/2014/main" id="{98E0B81C-295A-212E-B6ED-6F46C9F9C5A5}"/>
+              </a:ext>
+            </a:extLst>
+          </p:cNvPr>
+          <p:cNvSpPr txBox="1"/>
+          <p:nvPr/>
+        </p:nvSpPr>
+        <p:spPr>
+          <a:xfrm>
+            <a:off x="5723438" y="2828835"/>
+            <a:ext cx="5376111" cy="1477328"/>
+          </a:xfrm>
+          <a:prstGeom prst="rect">
+            <a:avLst/>
+          </a:prstGeom>
+          <a:noFill/>
+        </p:spPr>
+        <p:txBody>
+          <a:bodyPr wrap="square">
+            <a:spAutoFit/>
+          </a:bodyPr>
+          <a:lstStyle/>
+          <a:p>
+            <a:r>
+              <a:rPr lang="en-GB" b="1" dirty="0"/>
+              <a:t>Basket (Panier)</a:t>
+            </a:r>
+            <a:endParaRPr lang="en-GB" dirty="0"/>
+          </a:p>
+          <a:p>
+            <a:r>
+              <a:rPr lang="en-GB" dirty="0"/>
+              <a:t>- id: Integer (PK)</a:t>
+            </a:r>
+          </a:p>
+          <a:p>
+            <a:r>
+              <a:rPr lang="en-GB" dirty="0"/>
+              <a:t>- client: </a:t>
+            </a:r>
+            <a:r>
+              <a:rPr lang="en-GB" dirty="0" err="1"/>
+              <a:t>ForeignKey</a:t>
+            </a:r>
+            <a:r>
+              <a:rPr lang="en-GB" dirty="0"/>
+              <a:t>(Client)</a:t>
+            </a:r>
+          </a:p>
+          <a:p>
+            <a:r>
+              <a:rPr lang="en-GB" dirty="0"/>
+              <a:t>- </a:t>
+            </a:r>
+            <a:r>
+              <a:rPr lang="en-GB" dirty="0" err="1"/>
+              <a:t>created_at</a:t>
+            </a:r>
+            <a:r>
+              <a:rPr lang="en-GB" dirty="0"/>
+              <a:t>: </a:t>
+            </a:r>
+            <a:r>
+              <a:rPr lang="en-GB" dirty="0" err="1"/>
+              <a:t>DateTime</a:t>
+            </a:r>
+            <a:endParaRPr lang="en-GB" dirty="0"/>
+          </a:p>
+          <a:p>
+            <a:r>
+              <a:rPr lang="en-GB" dirty="0"/>
+              <a:t>- products: </a:t>
+            </a:r>
+            <a:r>
+              <a:rPr lang="en-GB" dirty="0" err="1"/>
+              <a:t>ManyToMany</a:t>
+            </a:r>
+            <a:r>
+              <a:rPr lang="en-GB" dirty="0"/>
+              <a:t>(Product) through </a:t>
+            </a:r>
+            <a:r>
+              <a:rPr lang="en-GB" dirty="0" err="1"/>
+              <a:t>BasketItem</a:t>
+            </a:r>
+            <a:endParaRPr lang="en-GB" dirty="0"/>
+          </a:p>
+        </p:txBody>
+      </p:sp>
+      <p:sp>
+        <p:nvSpPr>
+          <p:cNvPr id="10" name="TextBox 9">
+            <a:extLst>
+              <a:ext uri="{FF2B5EF4-FFF2-40B4-BE49-F238E27FC236}">
+                <a16:creationId xmlns:a16="http://schemas.microsoft.com/office/drawing/2014/main" id="{37E437B4-DF9C-1A94-C42E-21503EFC945B}"/>
+              </a:ext>
+            </a:extLst>
+          </p:cNvPr>
+          <p:cNvSpPr txBox="1"/>
+          <p:nvPr/>
+        </p:nvSpPr>
+        <p:spPr>
+          <a:xfrm>
+            <a:off x="5856789" y="4539439"/>
+            <a:ext cx="5376111" cy="1754326"/>
+          </a:xfrm>
+          <a:prstGeom prst="rect">
+            <a:avLst/>
+          </a:prstGeom>
+          <a:noFill/>
+        </p:spPr>
+        <p:txBody>
+          <a:bodyPr wrap="square">
+            <a:spAutoFit/>
+          </a:bodyPr>
+          <a:lstStyle/>
+          <a:p>
+            <a:r>
+              <a:rPr lang="en-GB" b="1" dirty="0" err="1"/>
+              <a:t>BasketItem</a:t>
+            </a:r>
+            <a:r>
+              <a:rPr lang="en-GB" b="1" dirty="0"/>
+              <a:t> (Article du panier)</a:t>
+            </a:r>
+            <a:endParaRPr lang="en-GB" dirty="0"/>
+          </a:p>
+          <a:p>
+            <a:r>
+              <a:rPr lang="en-GB" dirty="0"/>
+              <a:t>- id: Integer (PK)</a:t>
+            </a:r>
+          </a:p>
+          <a:p>
+            <a:r>
+              <a:rPr lang="en-GB" dirty="0"/>
+              <a:t>- basket: </a:t>
+            </a:r>
+            <a:r>
+              <a:rPr lang="en-GB" dirty="0" err="1"/>
+              <a:t>ForeignKey</a:t>
+            </a:r>
+            <a:r>
+              <a:rPr lang="en-GB" dirty="0"/>
+              <a:t>(Basket)</a:t>
+            </a:r>
+          </a:p>
+          <a:p>
+            <a:r>
+              <a:rPr lang="en-GB" dirty="0"/>
+              <a:t>- product: </a:t>
+            </a:r>
+            <a:r>
+              <a:rPr lang="en-GB" dirty="0" err="1"/>
+              <a:t>ForeignKey</a:t>
+            </a:r>
+            <a:r>
+              <a:rPr lang="en-GB" dirty="0"/>
+              <a:t>(Product)</a:t>
+            </a:r>
+          </a:p>
+          <a:p>
+            <a:r>
+              <a:rPr lang="en-GB" dirty="0"/>
+              <a:t>- quantity: </a:t>
+            </a:r>
+            <a:r>
+              <a:rPr lang="en-GB" dirty="0" err="1"/>
+              <a:t>PositiveInteger</a:t>
+            </a:r>
+            <a:r>
+              <a:rPr lang="en-GB" dirty="0"/>
+              <a:t> [min: 1]</a:t>
+            </a:r>
+          </a:p>
+          <a:p>
+            <a:r>
+              <a:rPr lang="en-GB" dirty="0"/>
+              <a:t>- </a:t>
+            </a:r>
+            <a:r>
+              <a:rPr lang="en-GB" dirty="0" err="1"/>
+              <a:t>unique_t</a:t>
+            </a:r>
+            <a:endParaRPr lang="en-GB" dirty="0"/>
+          </a:p>
+        </p:txBody>
+      </p:sp>
     </p:spTree>
     <p:extLst>
       <p:ext uri="{BB962C8B-B14F-4D97-AF65-F5344CB8AC3E}">
-        <p14:creationId xmlns:p14="http://schemas.microsoft.com/office/powerpoint/2010/main" val="1571056947"/>
+        <p14:creationId xmlns:p14="http://schemas.microsoft.com/office/powerpoint/2010/main" val="628656966"/>
       </p:ext>
     </p:extLst>
   </p:cSld>

</xml_diff>